<commit_message>
Fix bugs:   + task over deadline   + export db
</commit_message>
<xml_diff>
--- a/Slide.pptx
+++ b/Slide.pptx
@@ -11,9 +11,9 @@
     <p:sldId id="256" r:id="rId2"/>
     <p:sldId id="261" r:id="rId3"/>
     <p:sldId id="258" r:id="rId4"/>
-    <p:sldId id="260" r:id="rId5"/>
-    <p:sldId id="259" r:id="rId6"/>
-    <p:sldId id="264" r:id="rId7"/>
+    <p:sldId id="259" r:id="rId5"/>
+    <p:sldId id="264" r:id="rId6"/>
+    <p:sldId id="260" r:id="rId7"/>
     <p:sldId id="271" r:id="rId8"/>
     <p:sldId id="265" r:id="rId9"/>
     <p:sldId id="266" r:id="rId10"/>
@@ -7817,8 +7817,8 @@
         </p:nvSpPr>
         <p:spPr>
           <a:xfrm>
-            <a:off x="7313271" y="160338"/>
-            <a:ext cx="4192174" cy="523220"/>
+            <a:off x="5907951" y="160338"/>
+            <a:ext cx="5597494" cy="523220"/>
           </a:xfrm>
           <a:prstGeom prst="rect">
             <a:avLst/>
@@ -7837,7 +7837,7 @@
                 <a:latin typeface="Arial" panose="020B0604020202020204" pitchFamily="34" charset="0"/>
                 <a:cs typeface="Arial" panose="020B0604020202020204" pitchFamily="34" charset="0"/>
               </a:rPr>
-              <a:t>CÔNG NGHỆ SỬ DỤNG</a:t>
+              <a:t>CHỨC NĂNG CỦA TRANG WEB</a:t>
             </a:r>
             <a:endParaRPr lang="en-US" sz="2800" b="1" dirty="0">
               <a:latin typeface="Arial" panose="020B0604020202020204" pitchFamily="34" charset="0"/>
@@ -7887,9 +7887,9 @@
       </p:sp>
       <p:pic>
         <p:nvPicPr>
-          <p:cNvPr id="2" name="Picture 1"/>
+          <p:cNvPr id="2056" name="Picture 8" descr="Vector Users Icon, Users Icon, Avatar Icon, User Icon PNG and ..."/>
           <p:cNvPicPr>
-            <a:picLocks noChangeAspect="1"/>
+            <a:picLocks noChangeAspect="1" noChangeArrowheads="1"/>
           </p:cNvPicPr>
           <p:nvPr/>
         </p:nvPicPr>
@@ -7901,81 +7901,121 @@
               </a:ext>
             </a:extLst>
           </a:blip>
+          <a:srcRect/>
           <a:stretch>
             <a:fillRect/>
           </a:stretch>
         </p:blipFill>
-        <p:spPr>
-          <a:xfrm>
-            <a:off x="6738831" y="1051559"/>
-            <a:ext cx="2138417" cy="1308110"/>
-          </a:xfrm>
-          <a:prstGeom prst="rect">
-            <a:avLst/>
-          </a:prstGeom>
-        </p:spPr>
-      </p:pic>
-      <p:sp>
-        <p:nvSpPr>
-          <p:cNvPr id="11" name="TextBox 10"/>
-          <p:cNvSpPr txBox="1"/>
-          <p:nvPr/>
-        </p:nvSpPr>
-        <p:spPr>
-          <a:xfrm>
-            <a:off x="8877248" y="2450015"/>
-            <a:ext cx="1902953" cy="523220"/>
+        <p:spPr bwMode="auto">
+          <a:xfrm>
+            <a:off x="460375" y="1583111"/>
+            <a:ext cx="1097280" cy="1097280"/>
           </a:xfrm>
           <a:prstGeom prst="rect">
             <a:avLst/>
           </a:prstGeom>
           <a:noFill/>
-        </p:spPr>
-        <p:txBody>
-          <a:bodyPr wrap="square" rtlCol="0">
+          <a:extLst>
+            <a:ext uri="{909E8E84-426E-40DD-AFC4-6F175D3DCCD1}">
+              <a14:hiddenFill xmlns:a14="http://schemas.microsoft.com/office/drawing/2010/main">
+                <a:solidFill>
+                  <a:srgbClr val="FFFFFF"/>
+                </a:solidFill>
+              </a14:hiddenFill>
+            </a:ext>
+          </a:extLst>
+        </p:spPr>
+      </p:pic>
+      <p:sp>
+        <p:nvSpPr>
+          <p:cNvPr id="6" name="TextBox 5"/>
+          <p:cNvSpPr txBox="1"/>
+          <p:nvPr/>
+        </p:nvSpPr>
+        <p:spPr>
+          <a:xfrm>
+            <a:off x="1557655" y="1583111"/>
+            <a:ext cx="1300356" cy="369332"/>
+          </a:xfrm>
+          <a:prstGeom prst="rect">
+            <a:avLst/>
+          </a:prstGeom>
+          <a:noFill/>
+        </p:spPr>
+        <p:txBody>
+          <a:bodyPr wrap="none" rtlCol="0">
             <a:spAutoFit/>
           </a:bodyPr>
           <a:lstStyle/>
           <a:p>
-            <a:pPr algn="ctr"/>
-            <a:r>
-              <a:rPr lang="en-US" sz="2800" i="1" dirty="0" smtClean="0">
+            <a:r>
+              <a:rPr lang="en-US" b="1" dirty="0" smtClean="0">
                 <a:latin typeface="Arial" panose="020B0604020202020204" pitchFamily="34" charset="0"/>
                 <a:cs typeface="Arial" panose="020B0604020202020204" pitchFamily="34" charset="0"/>
               </a:rPr>
-              <a:t>Express</a:t>
-            </a:r>
-            <a:endParaRPr lang="en-US" sz="2800" i="1" dirty="0">
+              <a:t>Tài Khoản</a:t>
+            </a:r>
+            <a:endParaRPr lang="en-US" b="1" dirty="0">
               <a:latin typeface="Arial" panose="020B0604020202020204" pitchFamily="34" charset="0"/>
               <a:cs typeface="Arial" panose="020B0604020202020204" pitchFamily="34" charset="0"/>
             </a:endParaRPr>
           </a:p>
         </p:txBody>
       </p:sp>
+      <p:sp>
+        <p:nvSpPr>
+          <p:cNvPr id="16" name="TextBox 15"/>
+          <p:cNvSpPr txBox="1"/>
+          <p:nvPr/>
+        </p:nvSpPr>
+        <p:spPr>
+          <a:xfrm>
+            <a:off x="5555046" y="1526837"/>
+            <a:ext cx="838691" cy="369332"/>
+          </a:xfrm>
+          <a:prstGeom prst="rect">
+            <a:avLst/>
+          </a:prstGeom>
+          <a:noFill/>
+        </p:spPr>
+        <p:txBody>
+          <a:bodyPr wrap="none" rtlCol="0">
+            <a:spAutoFit/>
+          </a:bodyPr>
+          <a:lstStyle/>
+          <a:p>
+            <a:r>
+              <a:rPr lang="en-US" b="1" dirty="0" smtClean="0">
+                <a:latin typeface="Arial" panose="020B0604020202020204" pitchFamily="34" charset="0"/>
+                <a:cs typeface="Arial" panose="020B0604020202020204" pitchFamily="34" charset="0"/>
+              </a:rPr>
+              <a:t>Nhóm</a:t>
+            </a:r>
+            <a:endParaRPr lang="en-US" b="1" dirty="0">
+              <a:latin typeface="Arial" panose="020B0604020202020204" pitchFamily="34" charset="0"/>
+              <a:cs typeface="Arial" panose="020B0604020202020204" pitchFamily="34" charset="0"/>
+            </a:endParaRPr>
+          </a:p>
+        </p:txBody>
+      </p:sp>
       <p:pic>
         <p:nvPicPr>
-          <p:cNvPr id="7" name="Picture 6"/>
+          <p:cNvPr id="8" name="Picture 7"/>
           <p:cNvPicPr>
             <a:picLocks noChangeAspect="1"/>
           </p:cNvPicPr>
           <p:nvPr/>
         </p:nvPicPr>
         <p:blipFill>
-          <a:blip r:embed="rId3">
-            <a:extLst>
-              <a:ext uri="{28A0092B-C50C-407E-A947-70E740481C1C}">
-                <a14:useLocalDpi xmlns:a14="http://schemas.microsoft.com/office/drawing/2010/main" val="0"/>
-              </a:ext>
-            </a:extLst>
-          </a:blip>
+          <a:blip r:embed="rId3"/>
           <a:stretch>
             <a:fillRect/>
           </a:stretch>
         </p:blipFill>
         <p:spPr>
           <a:xfrm>
-            <a:off x="6519383" y="2774247"/>
-            <a:ext cx="2357865" cy="2357865"/>
+            <a:off x="4504864" y="1579599"/>
+            <a:ext cx="1097280" cy="1097280"/>
           </a:xfrm>
           <a:prstGeom prst="rect">
             <a:avLst/>
@@ -7984,9 +8024,9 @@
       </p:pic>
       <p:pic>
         <p:nvPicPr>
-          <p:cNvPr id="8" name="Picture 7"/>
+          <p:cNvPr id="2060" name="Picture 12" descr="A Project Logo Vector PNG Transparent A Project Logo Vector.PNG ..."/>
           <p:cNvPicPr>
-            <a:picLocks noChangeAspect="1"/>
+            <a:picLocks noChangeAspect="1" noChangeArrowheads="1"/>
           </p:cNvPicPr>
           <p:nvPr/>
         </p:nvPicPr>
@@ -7998,25 +8038,113 @@
               </a:ext>
             </a:extLst>
           </a:blip>
+          <a:srcRect/>
           <a:stretch>
             <a:fillRect/>
           </a:stretch>
         </p:blipFill>
-        <p:spPr>
-          <a:xfrm>
-            <a:off x="8990027" y="4333871"/>
-            <a:ext cx="1677394" cy="811642"/>
+        <p:spPr bwMode="auto">
+          <a:xfrm>
+            <a:off x="8714344" y="1579599"/>
+            <a:ext cx="1097280" cy="1097280"/>
           </a:xfrm>
           <a:prstGeom prst="rect">
             <a:avLst/>
           </a:prstGeom>
+          <a:solidFill>
+            <a:schemeClr val="tx1"/>
+          </a:solidFill>
         </p:spPr>
       </p:pic>
+      <p:sp>
+        <p:nvSpPr>
+          <p:cNvPr id="21" name="TextBox 20"/>
+          <p:cNvSpPr txBox="1"/>
+          <p:nvPr/>
+        </p:nvSpPr>
+        <p:spPr>
+          <a:xfrm>
+            <a:off x="9803978" y="1583111"/>
+            <a:ext cx="1287532" cy="646331"/>
+          </a:xfrm>
+          <a:prstGeom prst="rect">
+            <a:avLst/>
+          </a:prstGeom>
+          <a:noFill/>
+        </p:spPr>
+        <p:txBody>
+          <a:bodyPr wrap="none" rtlCol="0">
+            <a:spAutoFit/>
+          </a:bodyPr>
+          <a:lstStyle/>
+          <a:p>
+            <a:r>
+              <a:rPr lang="en-US" b="1" dirty="0" smtClean="0">
+                <a:latin typeface="Arial" panose="020B0604020202020204" pitchFamily="34" charset="0"/>
+                <a:cs typeface="Arial" panose="020B0604020202020204" pitchFamily="34" charset="0"/>
+              </a:rPr>
+              <a:t>Bảng</a:t>
+            </a:r>
+          </a:p>
+          <a:p>
+            <a:r>
+              <a:rPr lang="en-US" b="1" dirty="0" smtClean="0">
+                <a:latin typeface="Arial" panose="020B0604020202020204" pitchFamily="34" charset="0"/>
+                <a:cs typeface="Arial" panose="020B0604020202020204" pitchFamily="34" charset="0"/>
+              </a:rPr>
+              <a:t>Công việc</a:t>
+            </a:r>
+            <a:endParaRPr lang="en-US" b="1" dirty="0">
+              <a:latin typeface="Arial" panose="020B0604020202020204" pitchFamily="34" charset="0"/>
+              <a:cs typeface="Arial" panose="020B0604020202020204" pitchFamily="34" charset="0"/>
+            </a:endParaRPr>
+          </a:p>
+        </p:txBody>
+      </p:sp>
+      <p:sp>
+        <p:nvSpPr>
+          <p:cNvPr id="11" name="AutoShape 14" descr="Task Blue png download - 512*512 - Free Transparent Task png ..."/>
+          <p:cNvSpPr>
+            <a:spLocks noChangeAspect="1" noChangeArrowheads="1"/>
+          </p:cNvSpPr>
+          <p:nvPr/>
+        </p:nvSpPr>
+        <p:spPr bwMode="auto">
+          <a:xfrm>
+            <a:off x="307975" y="7937"/>
+            <a:ext cx="304800" cy="304801"/>
+          </a:xfrm>
+          <a:prstGeom prst="rect">
+            <a:avLst/>
+          </a:prstGeom>
+          <a:noFill/>
+          <a:extLst>
+            <a:ext uri="{909E8E84-426E-40DD-AFC4-6F175D3DCCD1}">
+              <a14:hiddenFill xmlns:a14="http://schemas.microsoft.com/office/drawing/2010/main">
+                <a:solidFill>
+                  <a:srgbClr val="FFFFFF"/>
+                </a:solidFill>
+              </a14:hiddenFill>
+            </a:ext>
+          </a:extLst>
+        </p:spPr>
+        <p:txBody>
+          <a:bodyPr vert="horz" wrap="square" lIns="91440" tIns="45720" rIns="91440" bIns="45720" numCol="1" anchor="t" anchorCtr="0" compatLnSpc="1">
+            <a:prstTxWarp prst="textNoShape">
+              <a:avLst/>
+            </a:prstTxWarp>
+          </a:bodyPr>
+          <a:lstStyle/>
+          <a:p>
+            <a:endParaRPr lang="en-US"/>
+          </a:p>
+        </p:txBody>
+      </p:sp>
       <p:pic>
         <p:nvPicPr>
-          <p:cNvPr id="14" name="Picture 13"/>
+          <p:cNvPr id="2066" name="Picture 18" descr="Comment png icon 1 » PNG Image"/>
           <p:cNvPicPr>
-            <a:picLocks noChangeAspect="1"/>
+            <a:picLocks noChangeAspect="1" noChangeArrowheads="1"/>
           </p:cNvPicPr>
           <p:nvPr/>
         </p:nvPicPr>
@@ -8028,30 +8156,34 @@
               </a:ext>
             </a:extLst>
           </a:blip>
+          <a:srcRect/>
           <a:stretch>
             <a:fillRect/>
           </a:stretch>
         </p:blipFill>
-        <p:spPr>
-          <a:xfrm>
-            <a:off x="7275119" y="5381456"/>
-            <a:ext cx="1074199" cy="1074199"/>
+        <p:spPr bwMode="auto">
+          <a:xfrm>
+            <a:off x="460375" y="4118912"/>
+            <a:ext cx="1097280" cy="1097280"/>
           </a:xfrm>
           <a:prstGeom prst="rect">
             <a:avLst/>
           </a:prstGeom>
+          <a:solidFill>
+            <a:schemeClr val="tx1"/>
+          </a:solidFill>
         </p:spPr>
       </p:pic>
       <p:sp>
         <p:nvSpPr>
-          <p:cNvPr id="16" name="TextBox 15"/>
+          <p:cNvPr id="31" name="TextBox 30"/>
           <p:cNvSpPr txBox="1"/>
           <p:nvPr/>
         </p:nvSpPr>
         <p:spPr>
           <a:xfrm>
-            <a:off x="8191448" y="5986790"/>
-            <a:ext cx="1902953" cy="523220"/>
+            <a:off x="1557655" y="4150850"/>
+            <a:ext cx="1313180" cy="646331"/>
           </a:xfrm>
           <a:prstGeom prst="rect">
             <a:avLst/>
@@ -8059,29 +8191,69 @@
           <a:noFill/>
         </p:spPr>
         <p:txBody>
-          <a:bodyPr wrap="square" rtlCol="0">
+          <a:bodyPr wrap="none" rtlCol="0">
             <a:spAutoFit/>
           </a:bodyPr>
           <a:lstStyle/>
           <a:p>
-            <a:pPr algn="ctr"/>
-            <a:r>
-              <a:rPr lang="en-US" sz="2800" i="1" dirty="0" smtClean="0">
+            <a:r>
+              <a:rPr lang="en-US" b="1" dirty="0" smtClean="0">
                 <a:latin typeface="Arial" panose="020B0604020202020204" pitchFamily="34" charset="0"/>
                 <a:cs typeface="Arial" panose="020B0604020202020204" pitchFamily="34" charset="0"/>
               </a:rPr>
-              <a:t>Socket.io</a:t>
-            </a:r>
-            <a:endParaRPr lang="en-US" sz="2800" i="1" dirty="0">
+              <a:t>Trao Đổi </a:t>
+            </a:r>
+          </a:p>
+          <a:p>
+            <a:r>
+              <a:rPr lang="en-US" b="1" dirty="0" smtClean="0">
+                <a:latin typeface="Arial" panose="020B0604020202020204" pitchFamily="34" charset="0"/>
+                <a:cs typeface="Arial" panose="020B0604020202020204" pitchFamily="34" charset="0"/>
+              </a:rPr>
+              <a:t>Bình Luận</a:t>
+            </a:r>
+            <a:endParaRPr lang="en-US" b="1" dirty="0">
               <a:latin typeface="Arial" panose="020B0604020202020204" pitchFamily="34" charset="0"/>
               <a:cs typeface="Arial" panose="020B0604020202020204" pitchFamily="34" charset="0"/>
             </a:endParaRPr>
           </a:p>
         </p:txBody>
       </p:sp>
+      <p:sp>
+        <p:nvSpPr>
+          <p:cNvPr id="35" name="TextBox 34"/>
+          <p:cNvSpPr txBox="1"/>
+          <p:nvPr/>
+        </p:nvSpPr>
+        <p:spPr>
+          <a:xfrm>
+            <a:off x="5658176" y="4134678"/>
+            <a:ext cx="1390124" cy="369332"/>
+          </a:xfrm>
+          <a:prstGeom prst="rect">
+            <a:avLst/>
+          </a:prstGeom>
+          <a:noFill/>
+        </p:spPr>
+        <p:txBody>
+          <a:bodyPr wrap="none" rtlCol="0">
+            <a:spAutoFit/>
+          </a:bodyPr>
+          <a:lstStyle/>
+          <a:p>
+            <a:r>
+              <a:rPr lang="en-US" b="1" dirty="0" smtClean="0">
+                <a:latin typeface="Arial" panose="020B0604020202020204" pitchFamily="34" charset="0"/>
+                <a:cs typeface="Arial" panose="020B0604020202020204" pitchFamily="34" charset="0"/>
+              </a:rPr>
+              <a:t>Thông Báo</a:t>
+            </a:r>
+          </a:p>
+        </p:txBody>
+      </p:sp>
       <p:pic>
         <p:nvPicPr>
-          <p:cNvPr id="19" name="Picture 18"/>
+          <p:cNvPr id="24" name="Picture 23"/>
           <p:cNvPicPr>
             <a:picLocks noChangeAspect="1"/>
           </p:cNvPicPr>
@@ -8101,17 +8273,20 @@
         </p:blipFill>
         <p:spPr>
           <a:xfrm>
-            <a:off x="3373344" y="4299125"/>
-            <a:ext cx="1279350" cy="1279350"/>
+            <a:off x="4563832" y="4147922"/>
+            <a:ext cx="1097280" cy="1097280"/>
           </a:xfrm>
           <a:prstGeom prst="rect">
             <a:avLst/>
           </a:prstGeom>
+          <a:solidFill>
+            <a:schemeClr val="tx1"/>
+          </a:solidFill>
         </p:spPr>
       </p:pic>
       <p:pic>
         <p:nvPicPr>
-          <p:cNvPr id="21" name="Picture 20"/>
+          <p:cNvPr id="25" name="Picture 24"/>
           <p:cNvPicPr>
             <a:picLocks noChangeAspect="1"/>
           </p:cNvPicPr>
@@ -8131,108 +8306,57 @@
         </p:blipFill>
         <p:spPr>
           <a:xfrm>
-            <a:off x="1381178" y="4102169"/>
-            <a:ext cx="1245714" cy="1273891"/>
+            <a:off x="8706564" y="4135857"/>
+            <a:ext cx="1097280" cy="1097280"/>
           </a:xfrm>
           <a:prstGeom prst="rect">
             <a:avLst/>
           </a:prstGeom>
+          <a:solidFill>
+            <a:schemeClr val="tx1"/>
+          </a:solidFill>
         </p:spPr>
       </p:pic>
-      <p:pic>
-        <p:nvPicPr>
-          <p:cNvPr id="22" name="Picture 21"/>
-          <p:cNvPicPr>
-            <a:picLocks noChangeAspect="1"/>
-          </p:cNvPicPr>
+      <p:sp>
+        <p:nvSpPr>
+          <p:cNvPr id="40" name="TextBox 39"/>
+          <p:cNvSpPr txBox="1"/>
           <p:nvPr/>
-        </p:nvPicPr>
-        <p:blipFill>
-          <a:blip r:embed="rId8">
-            <a:extLst>
-              <a:ext uri="{28A0092B-C50C-407E-A947-70E740481C1C}">
-                <a14:useLocalDpi xmlns:a14="http://schemas.microsoft.com/office/drawing/2010/main" val="0"/>
-              </a:ext>
-            </a:extLst>
-          </a:blip>
-          <a:stretch>
-            <a:fillRect/>
-          </a:stretch>
-        </p:blipFill>
-        <p:spPr>
-          <a:xfrm>
-            <a:off x="1059544" y="1204849"/>
-            <a:ext cx="2579799" cy="1102864"/>
+        </p:nvSpPr>
+        <p:spPr>
+          <a:xfrm>
+            <a:off x="9811624" y="4118912"/>
+            <a:ext cx="2031325" cy="369332"/>
           </a:xfrm>
           <a:prstGeom prst="rect">
             <a:avLst/>
           </a:prstGeom>
-        </p:spPr>
-      </p:pic>
-      <p:pic>
-        <p:nvPicPr>
-          <p:cNvPr id="23" name="Picture 22"/>
-          <p:cNvPicPr>
-            <a:picLocks noChangeAspect="1"/>
-          </p:cNvPicPr>
-          <p:nvPr/>
-        </p:nvPicPr>
-        <p:blipFill>
-          <a:blip r:embed="rId9">
-            <a:extLst>
-              <a:ext uri="{28A0092B-C50C-407E-A947-70E740481C1C}">
-                <a14:useLocalDpi xmlns:a14="http://schemas.microsoft.com/office/drawing/2010/main" val="0"/>
-              </a:ext>
-            </a:extLst>
-          </a:blip>
-          <a:stretch>
-            <a:fillRect/>
-          </a:stretch>
-        </p:blipFill>
-        <p:spPr>
-          <a:xfrm>
-            <a:off x="3901904" y="1094293"/>
-            <a:ext cx="1323975" cy="1323975"/>
-          </a:xfrm>
-          <a:prstGeom prst="rect">
-            <a:avLst/>
-          </a:prstGeom>
-        </p:spPr>
-      </p:pic>
-      <p:pic>
-        <p:nvPicPr>
-          <p:cNvPr id="24" name="Picture 23"/>
-          <p:cNvPicPr>
-            <a:picLocks noChangeAspect="1"/>
-          </p:cNvPicPr>
-          <p:nvPr/>
-        </p:nvPicPr>
-        <p:blipFill>
-          <a:blip r:embed="rId10">
-            <a:extLst>
-              <a:ext uri="{28A0092B-C50C-407E-A947-70E740481C1C}">
-                <a14:useLocalDpi xmlns:a14="http://schemas.microsoft.com/office/drawing/2010/main" val="0"/>
-              </a:ext>
-            </a:extLst>
-          </a:blip>
-          <a:stretch>
-            <a:fillRect/>
-          </a:stretch>
-        </p:blipFill>
-        <p:spPr>
-          <a:xfrm>
-            <a:off x="2626892" y="2506310"/>
-            <a:ext cx="1571625" cy="1571625"/>
-          </a:xfrm>
-          <a:prstGeom prst="rect">
-            <a:avLst/>
-          </a:prstGeom>
-        </p:spPr>
-      </p:pic>
+          <a:noFill/>
+        </p:spPr>
+        <p:txBody>
+          <a:bodyPr wrap="none" rtlCol="0">
+            <a:spAutoFit/>
+          </a:bodyPr>
+          <a:lstStyle/>
+          <a:p>
+            <a:r>
+              <a:rPr lang="en-US" b="1" dirty="0" smtClean="0">
+                <a:latin typeface="Arial" panose="020B0604020202020204" pitchFamily="34" charset="0"/>
+                <a:cs typeface="Arial" panose="020B0604020202020204" pitchFamily="34" charset="0"/>
+              </a:rPr>
+              <a:t>Đánh giá kết quả</a:t>
+            </a:r>
+            <a:endParaRPr lang="en-US" b="1" dirty="0">
+              <a:latin typeface="Arial" panose="020B0604020202020204" pitchFamily="34" charset="0"/>
+              <a:cs typeface="Arial" panose="020B0604020202020204" pitchFamily="34" charset="0"/>
+            </a:endParaRPr>
+          </a:p>
+        </p:txBody>
+      </p:sp>
     </p:spTree>
     <p:extLst>
       <p:ext uri="{BB962C8B-B14F-4D97-AF65-F5344CB8AC3E}">
-        <p14:creationId xmlns:p14="http://schemas.microsoft.com/office/powerpoint/2010/main" val="802297981"/>
+        <p14:creationId xmlns:p14="http://schemas.microsoft.com/office/powerpoint/2010/main" val="1425350224"/>
       </p:ext>
     </p:extLst>
   </p:cSld>
@@ -8298,8 +8422,8 @@
         </p:nvSpPr>
         <p:spPr>
           <a:xfrm>
-            <a:off x="5907951" y="160338"/>
-            <a:ext cx="5597494" cy="523220"/>
+            <a:off x="10222722" y="281927"/>
+            <a:ext cx="1282723" cy="523220"/>
           </a:xfrm>
           <a:prstGeom prst="rect">
             <a:avLst/>
@@ -8318,7 +8442,7 @@
                 <a:latin typeface="Arial" panose="020B0604020202020204" pitchFamily="34" charset="0"/>
                 <a:cs typeface="Arial" panose="020B0604020202020204" pitchFamily="34" charset="0"/>
               </a:rPr>
-              <a:t>CHỨC NĂNG CỦA TRANG WEB</a:t>
+              <a:t>NHÓM</a:t>
             </a:r>
             <a:endParaRPr lang="en-US" sz="2800" b="1" dirty="0">
               <a:latin typeface="Arial" panose="020B0604020202020204" pitchFamily="34" charset="0"/>
@@ -8329,94 +8453,290 @@
       </p:sp>
       <p:sp>
         <p:nvSpPr>
-          <p:cNvPr id="3" name="AutoShape 2" descr="Download Free png Work Schedule, Vector Material, Schedules, Work ..."/>
-          <p:cNvSpPr>
-            <a:spLocks noChangeAspect="1" noChangeArrowheads="1"/>
-          </p:cNvSpPr>
+          <p:cNvPr id="6" name="TextBox 5"/>
+          <p:cNvSpPr txBox="1"/>
           <p:nvPr/>
         </p:nvSpPr>
-        <p:spPr bwMode="auto">
-          <a:xfrm>
-            <a:off x="155575" y="-144463"/>
-            <a:ext cx="304800" cy="304801"/>
+        <p:spPr>
+          <a:xfrm>
+            <a:off x="855526" y="1060596"/>
+            <a:ext cx="1569660" cy="369332"/>
           </a:xfrm>
           <a:prstGeom prst="rect">
             <a:avLst/>
           </a:prstGeom>
           <a:noFill/>
-          <a:extLst>
-            <a:ext uri="{909E8E84-426E-40DD-AFC4-6F175D3DCCD1}">
-              <a14:hiddenFill xmlns:a14="http://schemas.microsoft.com/office/drawing/2010/main">
-                <a:solidFill>
-                  <a:srgbClr val="FFFFFF"/>
-                </a:solidFill>
-              </a14:hiddenFill>
-            </a:ext>
-          </a:extLst>
-        </p:spPr>
-        <p:txBody>
-          <a:bodyPr vert="horz" wrap="square" lIns="91440" tIns="45720" rIns="91440" bIns="45720" numCol="1" anchor="t" anchorCtr="0" compatLnSpc="1">
-            <a:prstTxWarp prst="textNoShape">
-              <a:avLst/>
-            </a:prstTxWarp>
+        </p:spPr>
+        <p:txBody>
+          <a:bodyPr wrap="none" rtlCol="0">
+            <a:spAutoFit/>
           </a:bodyPr>
           <a:lstStyle/>
           <a:p>
-            <a:endParaRPr lang="en-US"/>
-          </a:p>
-        </p:txBody>
-      </p:sp>
-      <p:pic>
-        <p:nvPicPr>
-          <p:cNvPr id="2056" name="Picture 8" descr="Vector Users Icon, Users Icon, Avatar Icon, User Icon PNG and ..."/>
-          <p:cNvPicPr>
-            <a:picLocks noChangeAspect="1" noChangeArrowheads="1"/>
-          </p:cNvPicPr>
+            <a:r>
+              <a:rPr lang="en-US" b="1" dirty="0" smtClean="0">
+                <a:latin typeface="Arial" panose="020B0604020202020204" pitchFamily="34" charset="0"/>
+                <a:cs typeface="Arial" panose="020B0604020202020204" pitchFamily="34" charset="0"/>
+              </a:rPr>
+              <a:t>1. Tạo Nhóm</a:t>
+            </a:r>
+            <a:endParaRPr lang="en-US" b="1" dirty="0">
+              <a:latin typeface="Arial" panose="020B0604020202020204" pitchFamily="34" charset="0"/>
+              <a:cs typeface="Arial" panose="020B0604020202020204" pitchFamily="34" charset="0"/>
+            </a:endParaRPr>
+          </a:p>
+        </p:txBody>
+      </p:sp>
+      <p:sp>
+        <p:nvSpPr>
+          <p:cNvPr id="7" name="TextBox 6"/>
+          <p:cNvSpPr txBox="1"/>
           <p:nvPr/>
-        </p:nvPicPr>
-        <p:blipFill>
-          <a:blip r:embed="rId2">
-            <a:extLst>
-              <a:ext uri="{28A0092B-C50C-407E-A947-70E740481C1C}">
-                <a14:useLocalDpi xmlns:a14="http://schemas.microsoft.com/office/drawing/2010/main" val="0"/>
-              </a:ext>
-            </a:extLst>
-          </a:blip>
-          <a:srcRect/>
-          <a:stretch>
-            <a:fillRect/>
-          </a:stretch>
-        </p:blipFill>
-        <p:spPr bwMode="auto">
-          <a:xfrm>
-            <a:off x="460375" y="1583111"/>
-            <a:ext cx="1097280" cy="1097280"/>
+        </p:nvSpPr>
+        <p:spPr>
+          <a:xfrm>
+            <a:off x="855526" y="1898796"/>
+            <a:ext cx="2360583" cy="369332"/>
           </a:xfrm>
           <a:prstGeom prst="rect">
             <a:avLst/>
           </a:prstGeom>
           <a:noFill/>
-          <a:extLst>
-            <a:ext uri="{909E8E84-426E-40DD-AFC4-6F175D3DCCD1}">
-              <a14:hiddenFill xmlns:a14="http://schemas.microsoft.com/office/drawing/2010/main">
-                <a:solidFill>
-                  <a:srgbClr val="FFFFFF"/>
-                </a:solidFill>
-              </a14:hiddenFill>
-            </a:ext>
-          </a:extLst>
-        </p:spPr>
-      </p:pic>
-      <p:sp>
-        <p:nvSpPr>
-          <p:cNvPr id="6" name="TextBox 5"/>
+        </p:spPr>
+        <p:txBody>
+          <a:bodyPr wrap="none" rtlCol="0">
+            <a:spAutoFit/>
+          </a:bodyPr>
+          <a:lstStyle/>
+          <a:p>
+            <a:r>
+              <a:rPr lang="en-US" b="1" dirty="0" smtClean="0">
+                <a:latin typeface="Arial" panose="020B0604020202020204" pitchFamily="34" charset="0"/>
+                <a:cs typeface="Arial" panose="020B0604020202020204" pitchFamily="34" charset="0"/>
+              </a:rPr>
+              <a:t>2. Thêm Thành Viên</a:t>
+            </a:r>
+            <a:endParaRPr lang="en-US" b="1" dirty="0">
+              <a:latin typeface="Arial" panose="020B0604020202020204" pitchFamily="34" charset="0"/>
+              <a:cs typeface="Arial" panose="020B0604020202020204" pitchFamily="34" charset="0"/>
+            </a:endParaRPr>
+          </a:p>
+        </p:txBody>
+      </p:sp>
+      <p:sp>
+        <p:nvSpPr>
+          <p:cNvPr id="3" name="Rounded Rectangle 2"/>
+          <p:cNvSpPr/>
+          <p:nvPr/>
+        </p:nvSpPr>
+        <p:spPr>
+          <a:xfrm>
+            <a:off x="1085850" y="2571748"/>
+            <a:ext cx="2039899" cy="726621"/>
+          </a:xfrm>
+          <a:prstGeom prst="roundRect">
+            <a:avLst/>
+          </a:prstGeom>
+        </p:spPr>
+        <p:style>
+          <a:lnRef idx="2">
+            <a:schemeClr val="accent1">
+              <a:shade val="50000"/>
+            </a:schemeClr>
+          </a:lnRef>
+          <a:fillRef idx="1">
+            <a:schemeClr val="accent1"/>
+          </a:fillRef>
+          <a:effectRef idx="0">
+            <a:schemeClr val="accent1"/>
+          </a:effectRef>
+          <a:fontRef idx="minor">
+            <a:schemeClr val="lt1"/>
+          </a:fontRef>
+        </p:style>
+        <p:txBody>
+          <a:bodyPr rtlCol="0" anchor="ctr"/>
+          <a:lstStyle/>
+          <a:p>
+            <a:pPr algn="ctr"/>
+            <a:r>
+              <a:rPr lang="en-US" dirty="0" smtClean="0"/>
+              <a:t>Nhập Tên/ Email</a:t>
+            </a:r>
+            <a:endParaRPr lang="en-US" dirty="0"/>
+          </a:p>
+        </p:txBody>
+      </p:sp>
+      <p:sp>
+        <p:nvSpPr>
+          <p:cNvPr id="8" name="Rounded Rectangle 7"/>
+          <p:cNvSpPr/>
+          <p:nvPr/>
+        </p:nvSpPr>
+        <p:spPr>
+          <a:xfrm>
+            <a:off x="3469200" y="2571748"/>
+            <a:ext cx="1927391" cy="726621"/>
+          </a:xfrm>
+          <a:prstGeom prst="roundRect">
+            <a:avLst/>
+          </a:prstGeom>
+        </p:spPr>
+        <p:style>
+          <a:lnRef idx="2">
+            <a:schemeClr val="accent1">
+              <a:shade val="50000"/>
+            </a:schemeClr>
+          </a:lnRef>
+          <a:fillRef idx="1">
+            <a:schemeClr val="accent1"/>
+          </a:fillRef>
+          <a:effectRef idx="0">
+            <a:schemeClr val="accent1"/>
+          </a:effectRef>
+          <a:fontRef idx="minor">
+            <a:schemeClr val="lt1"/>
+          </a:fontRef>
+        </p:style>
+        <p:txBody>
+          <a:bodyPr rtlCol="0" anchor="ctr"/>
+          <a:lstStyle/>
+          <a:p>
+            <a:pPr algn="ctr"/>
+            <a:r>
+              <a:rPr lang="en-US" dirty="0" smtClean="0"/>
+              <a:t>Chọn Người Muốn Thêm</a:t>
+            </a:r>
+            <a:endParaRPr lang="en-US" dirty="0"/>
+          </a:p>
+        </p:txBody>
+      </p:sp>
+      <p:sp>
+        <p:nvSpPr>
+          <p:cNvPr id="9" name="Rounded Rectangle 8"/>
+          <p:cNvSpPr/>
+          <p:nvPr/>
+        </p:nvSpPr>
+        <p:spPr>
+          <a:xfrm>
+            <a:off x="5740042" y="2571748"/>
+            <a:ext cx="1927391" cy="726621"/>
+          </a:xfrm>
+          <a:prstGeom prst="roundRect">
+            <a:avLst/>
+          </a:prstGeom>
+        </p:spPr>
+        <p:style>
+          <a:lnRef idx="2">
+            <a:schemeClr val="accent1">
+              <a:shade val="50000"/>
+            </a:schemeClr>
+          </a:lnRef>
+          <a:fillRef idx="1">
+            <a:schemeClr val="accent1"/>
+          </a:fillRef>
+          <a:effectRef idx="0">
+            <a:schemeClr val="accent1"/>
+          </a:effectRef>
+          <a:fontRef idx="minor">
+            <a:schemeClr val="lt1"/>
+          </a:fontRef>
+        </p:style>
+        <p:txBody>
+          <a:bodyPr rtlCol="0" anchor="ctr"/>
+          <a:lstStyle/>
+          <a:p>
+            <a:pPr algn="ctr"/>
+            <a:r>
+              <a:rPr lang="en-US" dirty="0" smtClean="0"/>
+              <a:t>Thành Viên Mới Gia Nhập</a:t>
+            </a:r>
+            <a:endParaRPr lang="en-US" dirty="0"/>
+          </a:p>
+        </p:txBody>
+      </p:sp>
+      <p:cxnSp>
+        <p:nvCxnSpPr>
+          <p:cNvPr id="11" name="Straight Arrow Connector 10"/>
+          <p:cNvCxnSpPr>
+            <a:stCxn id="3" idx="3"/>
+            <a:endCxn id="8" idx="1"/>
+          </p:cNvCxnSpPr>
+          <p:nvPr/>
+        </p:nvCxnSpPr>
+        <p:spPr>
+          <a:xfrm>
+            <a:off x="3125749" y="2935059"/>
+            <a:ext cx="343451" cy="0"/>
+          </a:xfrm>
+          <a:prstGeom prst="straightConnector1">
+            <a:avLst/>
+          </a:prstGeom>
+          <a:ln>
+            <a:tailEnd type="triangle"/>
+          </a:ln>
+        </p:spPr>
+        <p:style>
+          <a:lnRef idx="2">
+            <a:schemeClr val="dk1"/>
+          </a:lnRef>
+          <a:fillRef idx="0">
+            <a:schemeClr val="dk1"/>
+          </a:fillRef>
+          <a:effectRef idx="1">
+            <a:schemeClr val="dk1"/>
+          </a:effectRef>
+          <a:fontRef idx="minor">
+            <a:schemeClr val="tx1"/>
+          </a:fontRef>
+        </p:style>
+      </p:cxnSp>
+      <p:cxnSp>
+        <p:nvCxnSpPr>
+          <p:cNvPr id="13" name="Straight Arrow Connector 12"/>
+          <p:cNvCxnSpPr>
+            <a:stCxn id="8" idx="3"/>
+            <a:endCxn id="9" idx="1"/>
+          </p:cNvCxnSpPr>
+          <p:nvPr/>
+        </p:nvCxnSpPr>
+        <p:spPr>
+          <a:xfrm>
+            <a:off x="5396591" y="2935059"/>
+            <a:ext cx="343451" cy="0"/>
+          </a:xfrm>
+          <a:prstGeom prst="straightConnector1">
+            <a:avLst/>
+          </a:prstGeom>
+          <a:ln>
+            <a:tailEnd type="triangle"/>
+          </a:ln>
+        </p:spPr>
+        <p:style>
+          <a:lnRef idx="2">
+            <a:schemeClr val="dk1"/>
+          </a:lnRef>
+          <a:fillRef idx="0">
+            <a:schemeClr val="dk1"/>
+          </a:fillRef>
+          <a:effectRef idx="1">
+            <a:schemeClr val="dk1"/>
+          </a:effectRef>
+          <a:fontRef idx="minor">
+            <a:schemeClr val="tx1"/>
+          </a:fontRef>
+        </p:style>
+      </p:cxnSp>
+      <p:sp>
+        <p:nvSpPr>
+          <p:cNvPr id="14" name="TextBox 13"/>
           <p:cNvSpPr txBox="1"/>
           <p:nvPr/>
         </p:nvSpPr>
         <p:spPr>
           <a:xfrm>
-            <a:off x="1557655" y="1583111"/>
-            <a:ext cx="1300356" cy="369332"/>
+            <a:off x="1122997" y="3324990"/>
+            <a:ext cx="1965603" cy="276999"/>
           </a:xfrm>
           <a:prstGeom prst="rect">
             <a:avLst/>
@@ -8430,11 +8750,57 @@
           <a:lstStyle/>
           <a:p>
             <a:r>
+              <a:rPr lang="en-US" sz="1200" b="1" dirty="0" smtClean="0">
+                <a:solidFill>
+                  <a:schemeClr val="tx1">
+                    <a:lumMod val="85000"/>
+                  </a:schemeClr>
+                </a:solidFill>
+                <a:latin typeface="Arial" panose="020B0604020202020204" pitchFamily="34" charset="0"/>
+                <a:cs typeface="Arial" panose="020B0604020202020204" pitchFamily="34" charset="0"/>
+              </a:rPr>
+              <a:t>Thành Viên Trong Nhóm</a:t>
+            </a:r>
+            <a:endParaRPr lang="en-US" sz="1200" b="1" dirty="0">
+              <a:solidFill>
+                <a:schemeClr val="tx1">
+                  <a:lumMod val="85000"/>
+                </a:schemeClr>
+              </a:solidFill>
+              <a:latin typeface="Arial" panose="020B0604020202020204" pitchFamily="34" charset="0"/>
+              <a:cs typeface="Arial" panose="020B0604020202020204" pitchFamily="34" charset="0"/>
+            </a:endParaRPr>
+          </a:p>
+        </p:txBody>
+      </p:sp>
+      <p:sp>
+        <p:nvSpPr>
+          <p:cNvPr id="15" name="TextBox 14"/>
+          <p:cNvSpPr txBox="1"/>
+          <p:nvPr/>
+        </p:nvSpPr>
+        <p:spPr>
+          <a:xfrm>
+            <a:off x="855526" y="3903098"/>
+            <a:ext cx="2475999" cy="369332"/>
+          </a:xfrm>
+          <a:prstGeom prst="rect">
+            <a:avLst/>
+          </a:prstGeom>
+          <a:noFill/>
+        </p:spPr>
+        <p:txBody>
+          <a:bodyPr wrap="none" rtlCol="0">
+            <a:spAutoFit/>
+          </a:bodyPr>
+          <a:lstStyle/>
+          <a:p>
+            <a:r>
               <a:rPr lang="en-US" b="1" dirty="0" smtClean="0">
                 <a:latin typeface="Arial" panose="020B0604020202020204" pitchFamily="34" charset="0"/>
                 <a:cs typeface="Arial" panose="020B0604020202020204" pitchFamily="34" charset="0"/>
               </a:rPr>
-              <a:t>Tài Khoản</a:t>
+              <a:t>3. Yêu Cầu Tham Gia</a:t>
             </a:r>
             <a:endParaRPr lang="en-US" b="1" dirty="0">
               <a:latin typeface="Arial" panose="020B0604020202020204" pitchFamily="34" charset="0"/>
@@ -8445,14 +8811,378 @@
       </p:sp>
       <p:sp>
         <p:nvSpPr>
-          <p:cNvPr id="16" name="TextBox 15"/>
+          <p:cNvPr id="16" name="Rounded Rectangle 15"/>
+          <p:cNvSpPr/>
+          <p:nvPr/>
+        </p:nvSpPr>
+        <p:spPr>
+          <a:xfrm>
+            <a:off x="1085850" y="4588966"/>
+            <a:ext cx="2039899" cy="726621"/>
+          </a:xfrm>
+          <a:prstGeom prst="roundRect">
+            <a:avLst/>
+          </a:prstGeom>
+        </p:spPr>
+        <p:style>
+          <a:lnRef idx="2">
+            <a:schemeClr val="accent1">
+              <a:shade val="50000"/>
+            </a:schemeClr>
+          </a:lnRef>
+          <a:fillRef idx="1">
+            <a:schemeClr val="accent1"/>
+          </a:fillRef>
+          <a:effectRef idx="0">
+            <a:schemeClr val="accent1"/>
+          </a:effectRef>
+          <a:fontRef idx="minor">
+            <a:schemeClr val="lt1"/>
+          </a:fontRef>
+        </p:style>
+        <p:txBody>
+          <a:bodyPr rtlCol="0" anchor="ctr"/>
+          <a:lstStyle/>
+          <a:p>
+            <a:pPr algn="ctr"/>
+            <a:r>
+              <a:rPr lang="en-US" dirty="0" smtClean="0"/>
+              <a:t>Tìm Nhóm Theo Tên</a:t>
+            </a:r>
+            <a:endParaRPr lang="en-US" dirty="0"/>
+          </a:p>
+        </p:txBody>
+      </p:sp>
+      <p:sp>
+        <p:nvSpPr>
+          <p:cNvPr id="17" name="Rounded Rectangle 16"/>
+          <p:cNvSpPr/>
+          <p:nvPr/>
+        </p:nvSpPr>
+        <p:spPr>
+          <a:xfrm>
+            <a:off x="3469200" y="4588966"/>
+            <a:ext cx="1927391" cy="726621"/>
+          </a:xfrm>
+          <a:prstGeom prst="roundRect">
+            <a:avLst/>
+          </a:prstGeom>
+        </p:spPr>
+        <p:style>
+          <a:lnRef idx="2">
+            <a:schemeClr val="accent1">
+              <a:shade val="50000"/>
+            </a:schemeClr>
+          </a:lnRef>
+          <a:fillRef idx="1">
+            <a:schemeClr val="accent1"/>
+          </a:fillRef>
+          <a:effectRef idx="0">
+            <a:schemeClr val="accent1"/>
+          </a:effectRef>
+          <a:fontRef idx="minor">
+            <a:schemeClr val="lt1"/>
+          </a:fontRef>
+        </p:style>
+        <p:txBody>
+          <a:bodyPr rtlCol="0" anchor="ctr"/>
+          <a:lstStyle/>
+          <a:p>
+            <a:pPr algn="ctr"/>
+            <a:r>
+              <a:rPr lang="en-US" dirty="0" smtClean="0"/>
+              <a:t>Chọn Nhóm</a:t>
+            </a:r>
+            <a:endParaRPr lang="en-US" dirty="0"/>
+          </a:p>
+        </p:txBody>
+      </p:sp>
+      <p:sp>
+        <p:nvSpPr>
+          <p:cNvPr id="18" name="Rounded Rectangle 17"/>
+          <p:cNvSpPr/>
+          <p:nvPr/>
+        </p:nvSpPr>
+        <p:spPr>
+          <a:xfrm>
+            <a:off x="5740042" y="4588966"/>
+            <a:ext cx="1927391" cy="726621"/>
+          </a:xfrm>
+          <a:prstGeom prst="roundRect">
+            <a:avLst/>
+          </a:prstGeom>
+        </p:spPr>
+        <p:style>
+          <a:lnRef idx="2">
+            <a:schemeClr val="accent1">
+              <a:shade val="50000"/>
+            </a:schemeClr>
+          </a:lnRef>
+          <a:fillRef idx="1">
+            <a:schemeClr val="accent1"/>
+          </a:fillRef>
+          <a:effectRef idx="0">
+            <a:schemeClr val="accent1"/>
+          </a:effectRef>
+          <a:fontRef idx="minor">
+            <a:schemeClr val="lt1"/>
+          </a:fontRef>
+        </p:style>
+        <p:txBody>
+          <a:bodyPr rtlCol="0" anchor="ctr"/>
+          <a:lstStyle/>
+          <a:p>
+            <a:pPr algn="ctr"/>
+            <a:r>
+              <a:rPr lang="en-US" dirty="0" smtClean="0"/>
+              <a:t>Thông Báo Có Yêu Cầu Mới</a:t>
+            </a:r>
+            <a:endParaRPr lang="en-US" dirty="0"/>
+          </a:p>
+        </p:txBody>
+      </p:sp>
+      <p:cxnSp>
+        <p:nvCxnSpPr>
+          <p:cNvPr id="19" name="Straight Arrow Connector 18"/>
+          <p:cNvCxnSpPr>
+            <a:stCxn id="16" idx="3"/>
+            <a:endCxn id="17" idx="1"/>
+          </p:cNvCxnSpPr>
+          <p:nvPr/>
+        </p:nvCxnSpPr>
+        <p:spPr>
+          <a:xfrm>
+            <a:off x="3125749" y="4952277"/>
+            <a:ext cx="343451" cy="0"/>
+          </a:xfrm>
+          <a:prstGeom prst="straightConnector1">
+            <a:avLst/>
+          </a:prstGeom>
+          <a:ln>
+            <a:tailEnd type="triangle"/>
+          </a:ln>
+        </p:spPr>
+        <p:style>
+          <a:lnRef idx="2">
+            <a:schemeClr val="dk1"/>
+          </a:lnRef>
+          <a:fillRef idx="0">
+            <a:schemeClr val="dk1"/>
+          </a:fillRef>
+          <a:effectRef idx="1">
+            <a:schemeClr val="dk1"/>
+          </a:effectRef>
+          <a:fontRef idx="minor">
+            <a:schemeClr val="tx1"/>
+          </a:fontRef>
+        </p:style>
+      </p:cxnSp>
+      <p:cxnSp>
+        <p:nvCxnSpPr>
+          <p:cNvPr id="22" name="Straight Arrow Connector 21"/>
+          <p:cNvCxnSpPr>
+            <a:stCxn id="18" idx="3"/>
+            <a:endCxn id="25" idx="1"/>
+          </p:cNvCxnSpPr>
+          <p:nvPr/>
+        </p:nvCxnSpPr>
+        <p:spPr>
+          <a:xfrm>
+            <a:off x="7667433" y="4952277"/>
+            <a:ext cx="343451" cy="0"/>
+          </a:xfrm>
+          <a:prstGeom prst="straightConnector1">
+            <a:avLst/>
+          </a:prstGeom>
+          <a:ln>
+            <a:tailEnd type="triangle"/>
+          </a:ln>
+        </p:spPr>
+        <p:style>
+          <a:lnRef idx="2">
+            <a:schemeClr val="dk1"/>
+          </a:lnRef>
+          <a:fillRef idx="0">
+            <a:schemeClr val="dk1"/>
+          </a:fillRef>
+          <a:effectRef idx="1">
+            <a:schemeClr val="dk1"/>
+          </a:effectRef>
+          <a:fontRef idx="minor">
+            <a:schemeClr val="tx1"/>
+          </a:fontRef>
+        </p:style>
+      </p:cxnSp>
+      <p:sp>
+        <p:nvSpPr>
+          <p:cNvPr id="25" name="Rounded Rectangle 24"/>
+          <p:cNvSpPr/>
+          <p:nvPr/>
+        </p:nvSpPr>
+        <p:spPr>
+          <a:xfrm>
+            <a:off x="8010884" y="4588966"/>
+            <a:ext cx="1927391" cy="726621"/>
+          </a:xfrm>
+          <a:prstGeom prst="roundRect">
+            <a:avLst/>
+          </a:prstGeom>
+        </p:spPr>
+        <p:style>
+          <a:lnRef idx="2">
+            <a:schemeClr val="accent1">
+              <a:shade val="50000"/>
+            </a:schemeClr>
+          </a:lnRef>
+          <a:fillRef idx="1">
+            <a:schemeClr val="accent1"/>
+          </a:fillRef>
+          <a:effectRef idx="0">
+            <a:schemeClr val="accent1"/>
+          </a:effectRef>
+          <a:fontRef idx="minor">
+            <a:schemeClr val="lt1"/>
+          </a:fontRef>
+        </p:style>
+        <p:txBody>
+          <a:bodyPr rtlCol="0" anchor="ctr"/>
+          <a:lstStyle/>
+          <a:p>
+            <a:pPr algn="ctr"/>
+            <a:r>
+              <a:rPr lang="en-US" dirty="0" smtClean="0"/>
+              <a:t>Đồng Ý</a:t>
+            </a:r>
+            <a:endParaRPr lang="en-US" dirty="0"/>
+          </a:p>
+        </p:txBody>
+      </p:sp>
+      <p:cxnSp>
+        <p:nvCxnSpPr>
+          <p:cNvPr id="35" name="Straight Arrow Connector 34"/>
+          <p:cNvCxnSpPr>
+            <a:stCxn id="17" idx="3"/>
+            <a:endCxn id="18" idx="1"/>
+          </p:cNvCxnSpPr>
+          <p:nvPr/>
+        </p:nvCxnSpPr>
+        <p:spPr>
+          <a:xfrm>
+            <a:off x="5396591" y="4952277"/>
+            <a:ext cx="343451" cy="0"/>
+          </a:xfrm>
+          <a:prstGeom prst="straightConnector1">
+            <a:avLst/>
+          </a:prstGeom>
+          <a:ln>
+            <a:tailEnd type="triangle"/>
+          </a:ln>
+        </p:spPr>
+        <p:style>
+          <a:lnRef idx="2">
+            <a:schemeClr val="dk1"/>
+          </a:lnRef>
+          <a:fillRef idx="0">
+            <a:schemeClr val="dk1"/>
+          </a:fillRef>
+          <a:effectRef idx="1">
+            <a:schemeClr val="dk1"/>
+          </a:effectRef>
+          <a:fontRef idx="minor">
+            <a:schemeClr val="tx1"/>
+          </a:fontRef>
+        </p:style>
+      </p:cxnSp>
+      <p:sp>
+        <p:nvSpPr>
+          <p:cNvPr id="39" name="Rounded Rectangle 38"/>
+          <p:cNvSpPr/>
+          <p:nvPr/>
+        </p:nvSpPr>
+        <p:spPr>
+          <a:xfrm>
+            <a:off x="8010884" y="5678898"/>
+            <a:ext cx="1927391" cy="726621"/>
+          </a:xfrm>
+          <a:prstGeom prst="roundRect">
+            <a:avLst/>
+          </a:prstGeom>
+        </p:spPr>
+        <p:style>
+          <a:lnRef idx="2">
+            <a:schemeClr val="accent1">
+              <a:shade val="50000"/>
+            </a:schemeClr>
+          </a:lnRef>
+          <a:fillRef idx="1">
+            <a:schemeClr val="accent1"/>
+          </a:fillRef>
+          <a:effectRef idx="0">
+            <a:schemeClr val="accent1"/>
+          </a:effectRef>
+          <a:fontRef idx="minor">
+            <a:schemeClr val="lt1"/>
+          </a:fontRef>
+        </p:style>
+        <p:txBody>
+          <a:bodyPr rtlCol="0" anchor="ctr"/>
+          <a:lstStyle/>
+          <a:p>
+            <a:pPr algn="ctr"/>
+            <a:r>
+              <a:rPr lang="en-US" dirty="0" smtClean="0"/>
+              <a:t>Cầu Được Chấp Nhận</a:t>
+            </a:r>
+            <a:endParaRPr lang="en-US" dirty="0"/>
+          </a:p>
+        </p:txBody>
+      </p:sp>
+      <p:cxnSp>
+        <p:nvCxnSpPr>
+          <p:cNvPr id="40" name="Straight Arrow Connector 39"/>
+          <p:cNvCxnSpPr>
+            <a:stCxn id="25" idx="2"/>
+            <a:endCxn id="39" idx="0"/>
+          </p:cNvCxnSpPr>
+          <p:nvPr/>
+        </p:nvCxnSpPr>
+        <p:spPr>
+          <a:xfrm>
+            <a:off x="8974580" y="5315587"/>
+            <a:ext cx="0" cy="363311"/>
+          </a:xfrm>
+          <a:prstGeom prst="straightConnector1">
+            <a:avLst/>
+          </a:prstGeom>
+          <a:ln>
+            <a:tailEnd type="triangle"/>
+          </a:ln>
+        </p:spPr>
+        <p:style>
+          <a:lnRef idx="2">
+            <a:schemeClr val="dk1"/>
+          </a:lnRef>
+          <a:fillRef idx="0">
+            <a:schemeClr val="dk1"/>
+          </a:fillRef>
+          <a:effectRef idx="1">
+            <a:schemeClr val="dk1"/>
+          </a:effectRef>
+          <a:fontRef idx="minor">
+            <a:schemeClr val="tx1"/>
+          </a:fontRef>
+        </p:style>
+      </p:cxnSp>
+      <p:sp>
+        <p:nvSpPr>
+          <p:cNvPr id="44" name="TextBox 43"/>
           <p:cNvSpPr txBox="1"/>
           <p:nvPr/>
         </p:nvSpPr>
         <p:spPr>
           <a:xfrm>
-            <a:off x="5555046" y="1526837"/>
-            <a:ext cx="838691" cy="369332"/>
+            <a:off x="1085850" y="5401899"/>
+            <a:ext cx="2204450" cy="276999"/>
           </a:xfrm>
           <a:prstGeom prst="rect">
             <a:avLst/>
@@ -8466,87 +9196,39 @@
           <a:lstStyle/>
           <a:p>
             <a:r>
-              <a:rPr lang="en-US" b="1" dirty="0" smtClean="0">
+              <a:rPr lang="en-US" sz="1200" b="1" dirty="0" smtClean="0">
+                <a:solidFill>
+                  <a:schemeClr val="tx1">
+                    <a:lumMod val="85000"/>
+                  </a:schemeClr>
+                </a:solidFill>
                 <a:latin typeface="Arial" panose="020B0604020202020204" pitchFamily="34" charset="0"/>
                 <a:cs typeface="Arial" panose="020B0604020202020204" pitchFamily="34" charset="0"/>
               </a:rPr>
-              <a:t>Nhóm</a:t>
-            </a:r>
-            <a:endParaRPr lang="en-US" b="1" dirty="0">
+              <a:t>User Muốn Tham Gia Nhóm</a:t>
+            </a:r>
+            <a:endParaRPr lang="en-US" sz="1200" b="1" dirty="0">
+              <a:solidFill>
+                <a:schemeClr val="tx1">
+                  <a:lumMod val="85000"/>
+                </a:schemeClr>
+              </a:solidFill>
               <a:latin typeface="Arial" panose="020B0604020202020204" pitchFamily="34" charset="0"/>
               <a:cs typeface="Arial" panose="020B0604020202020204" pitchFamily="34" charset="0"/>
             </a:endParaRPr>
           </a:p>
         </p:txBody>
       </p:sp>
-      <p:pic>
-        <p:nvPicPr>
-          <p:cNvPr id="8" name="Picture 7"/>
-          <p:cNvPicPr>
-            <a:picLocks noChangeAspect="1"/>
-          </p:cNvPicPr>
-          <p:nvPr/>
-        </p:nvPicPr>
-        <p:blipFill>
-          <a:blip r:embed="rId3"/>
-          <a:stretch>
-            <a:fillRect/>
-          </a:stretch>
-        </p:blipFill>
-        <p:spPr>
-          <a:xfrm>
-            <a:off x="4504864" y="1579599"/>
-            <a:ext cx="1097280" cy="1097280"/>
-          </a:xfrm>
-          <a:prstGeom prst="rect">
-            <a:avLst/>
-          </a:prstGeom>
-        </p:spPr>
-      </p:pic>
-      <p:pic>
-        <p:nvPicPr>
-          <p:cNvPr id="2060" name="Picture 12" descr="A Project Logo Vector PNG Transparent A Project Logo Vector.PNG ..."/>
-          <p:cNvPicPr>
-            <a:picLocks noChangeAspect="1" noChangeArrowheads="1"/>
-          </p:cNvPicPr>
-          <p:nvPr/>
-        </p:nvPicPr>
-        <p:blipFill>
-          <a:blip r:embed="rId4">
-            <a:extLst>
-              <a:ext uri="{28A0092B-C50C-407E-A947-70E740481C1C}">
-                <a14:useLocalDpi xmlns:a14="http://schemas.microsoft.com/office/drawing/2010/main" val="0"/>
-              </a:ext>
-            </a:extLst>
-          </a:blip>
-          <a:srcRect/>
-          <a:stretch>
-            <a:fillRect/>
-          </a:stretch>
-        </p:blipFill>
-        <p:spPr bwMode="auto">
-          <a:xfrm>
-            <a:off x="8714344" y="1579599"/>
-            <a:ext cx="1097280" cy="1097280"/>
-          </a:xfrm>
-          <a:prstGeom prst="rect">
-            <a:avLst/>
-          </a:prstGeom>
-          <a:solidFill>
-            <a:schemeClr val="tx1"/>
-          </a:solidFill>
-        </p:spPr>
-      </p:pic>
-      <p:sp>
-        <p:nvSpPr>
-          <p:cNvPr id="21" name="TextBox 20"/>
+      <p:sp>
+        <p:nvSpPr>
+          <p:cNvPr id="23" name="TextBox 22"/>
           <p:cNvSpPr txBox="1"/>
           <p:nvPr/>
         </p:nvSpPr>
         <p:spPr>
           <a:xfrm>
-            <a:off x="9803978" y="1583111"/>
-            <a:ext cx="1287532" cy="646331"/>
+            <a:off x="5634708" y="5401897"/>
+            <a:ext cx="1965603" cy="276999"/>
           </a:xfrm>
           <a:prstGeom prst="rect">
             <a:avLst/>
@@ -8560,295 +9242,33 @@
           <a:lstStyle/>
           <a:p>
             <a:r>
-              <a:rPr lang="en-US" b="1" dirty="0" smtClean="0">
+              <a:rPr lang="en-US" sz="1200" b="1" dirty="0" smtClean="0">
+                <a:solidFill>
+                  <a:schemeClr val="tx1">
+                    <a:lumMod val="85000"/>
+                  </a:schemeClr>
+                </a:solidFill>
                 <a:latin typeface="Arial" panose="020B0604020202020204" pitchFamily="34" charset="0"/>
                 <a:cs typeface="Arial" panose="020B0604020202020204" pitchFamily="34" charset="0"/>
               </a:rPr>
-              <a:t>Bảng</a:t>
-            </a:r>
-          </a:p>
-          <a:p>
-            <a:r>
-              <a:rPr lang="en-US" b="1" dirty="0" smtClean="0">
-                <a:latin typeface="Arial" panose="020B0604020202020204" pitchFamily="34" charset="0"/>
-                <a:cs typeface="Arial" panose="020B0604020202020204" pitchFamily="34" charset="0"/>
-              </a:rPr>
-              <a:t>Công việc</a:t>
-            </a:r>
-            <a:endParaRPr lang="en-US" b="1" dirty="0">
+              <a:t>Thành Viên Trong Nhóm</a:t>
+            </a:r>
+            <a:endParaRPr lang="en-US" sz="1200" b="1" dirty="0">
+              <a:solidFill>
+                <a:schemeClr val="tx1">
+                  <a:lumMod val="85000"/>
+                </a:schemeClr>
+              </a:solidFill>
               <a:latin typeface="Arial" panose="020B0604020202020204" pitchFamily="34" charset="0"/>
               <a:cs typeface="Arial" panose="020B0604020202020204" pitchFamily="34" charset="0"/>
             </a:endParaRPr>
           </a:p>
         </p:txBody>
       </p:sp>
-      <p:sp>
-        <p:nvSpPr>
-          <p:cNvPr id="11" name="AutoShape 14" descr="Task Blue png download - 512*512 - Free Transparent Task png ..."/>
-          <p:cNvSpPr>
-            <a:spLocks noChangeAspect="1" noChangeArrowheads="1"/>
-          </p:cNvSpPr>
-          <p:nvPr/>
-        </p:nvSpPr>
-        <p:spPr bwMode="auto">
-          <a:xfrm>
-            <a:off x="307975" y="7937"/>
-            <a:ext cx="304800" cy="304801"/>
-          </a:xfrm>
-          <a:prstGeom prst="rect">
-            <a:avLst/>
-          </a:prstGeom>
-          <a:noFill/>
-          <a:extLst>
-            <a:ext uri="{909E8E84-426E-40DD-AFC4-6F175D3DCCD1}">
-              <a14:hiddenFill xmlns:a14="http://schemas.microsoft.com/office/drawing/2010/main">
-                <a:solidFill>
-                  <a:srgbClr val="FFFFFF"/>
-                </a:solidFill>
-              </a14:hiddenFill>
-            </a:ext>
-          </a:extLst>
-        </p:spPr>
-        <p:txBody>
-          <a:bodyPr vert="horz" wrap="square" lIns="91440" tIns="45720" rIns="91440" bIns="45720" numCol="1" anchor="t" anchorCtr="0" compatLnSpc="1">
-            <a:prstTxWarp prst="textNoShape">
-              <a:avLst/>
-            </a:prstTxWarp>
-          </a:bodyPr>
-          <a:lstStyle/>
-          <a:p>
-            <a:endParaRPr lang="en-US"/>
-          </a:p>
-        </p:txBody>
-      </p:sp>
-      <p:pic>
-        <p:nvPicPr>
-          <p:cNvPr id="2066" name="Picture 18" descr="Comment png icon 1 » PNG Image"/>
-          <p:cNvPicPr>
-            <a:picLocks noChangeAspect="1" noChangeArrowheads="1"/>
-          </p:cNvPicPr>
-          <p:nvPr/>
-        </p:nvPicPr>
-        <p:blipFill>
-          <a:blip r:embed="rId5">
-            <a:extLst>
-              <a:ext uri="{28A0092B-C50C-407E-A947-70E740481C1C}">
-                <a14:useLocalDpi xmlns:a14="http://schemas.microsoft.com/office/drawing/2010/main" val="0"/>
-              </a:ext>
-            </a:extLst>
-          </a:blip>
-          <a:srcRect/>
-          <a:stretch>
-            <a:fillRect/>
-          </a:stretch>
-        </p:blipFill>
-        <p:spPr bwMode="auto">
-          <a:xfrm>
-            <a:off x="460375" y="4118912"/>
-            <a:ext cx="1097280" cy="1097280"/>
-          </a:xfrm>
-          <a:prstGeom prst="rect">
-            <a:avLst/>
-          </a:prstGeom>
-          <a:solidFill>
-            <a:schemeClr val="tx1"/>
-          </a:solidFill>
-        </p:spPr>
-      </p:pic>
-      <p:sp>
-        <p:nvSpPr>
-          <p:cNvPr id="31" name="TextBox 30"/>
-          <p:cNvSpPr txBox="1"/>
-          <p:nvPr/>
-        </p:nvSpPr>
-        <p:spPr>
-          <a:xfrm>
-            <a:off x="1557655" y="4150850"/>
-            <a:ext cx="1313180" cy="646331"/>
-          </a:xfrm>
-          <a:prstGeom prst="rect">
-            <a:avLst/>
-          </a:prstGeom>
-          <a:noFill/>
-        </p:spPr>
-        <p:txBody>
-          <a:bodyPr wrap="none" rtlCol="0">
-            <a:spAutoFit/>
-          </a:bodyPr>
-          <a:lstStyle/>
-          <a:p>
-            <a:r>
-              <a:rPr lang="en-US" b="1" dirty="0" smtClean="0">
-                <a:latin typeface="Arial" panose="020B0604020202020204" pitchFamily="34" charset="0"/>
-                <a:cs typeface="Arial" panose="020B0604020202020204" pitchFamily="34" charset="0"/>
-              </a:rPr>
-              <a:t>Trao Đổi </a:t>
-            </a:r>
-          </a:p>
-          <a:p>
-            <a:r>
-              <a:rPr lang="en-US" b="1" dirty="0" smtClean="0">
-                <a:latin typeface="Arial" panose="020B0604020202020204" pitchFamily="34" charset="0"/>
-                <a:cs typeface="Arial" panose="020B0604020202020204" pitchFamily="34" charset="0"/>
-              </a:rPr>
-              <a:t>Bình Luận</a:t>
-            </a:r>
-            <a:endParaRPr lang="en-US" b="1" dirty="0">
-              <a:latin typeface="Arial" panose="020B0604020202020204" pitchFamily="34" charset="0"/>
-              <a:cs typeface="Arial" panose="020B0604020202020204" pitchFamily="34" charset="0"/>
-            </a:endParaRPr>
-          </a:p>
-        </p:txBody>
-      </p:sp>
-      <p:sp>
-        <p:nvSpPr>
-          <p:cNvPr id="35" name="TextBox 34"/>
-          <p:cNvSpPr txBox="1"/>
-          <p:nvPr/>
-        </p:nvSpPr>
-        <p:spPr>
-          <a:xfrm>
-            <a:off x="5658176" y="4134678"/>
-            <a:ext cx="1390124" cy="369332"/>
-          </a:xfrm>
-          <a:prstGeom prst="rect">
-            <a:avLst/>
-          </a:prstGeom>
-          <a:noFill/>
-        </p:spPr>
-        <p:txBody>
-          <a:bodyPr wrap="none" rtlCol="0">
-            <a:spAutoFit/>
-          </a:bodyPr>
-          <a:lstStyle/>
-          <a:p>
-            <a:r>
-              <a:rPr lang="en-US" b="1" dirty="0" smtClean="0">
-                <a:latin typeface="Arial" panose="020B0604020202020204" pitchFamily="34" charset="0"/>
-                <a:cs typeface="Arial" panose="020B0604020202020204" pitchFamily="34" charset="0"/>
-              </a:rPr>
-              <a:t>Thông </a:t>
-            </a:r>
-            <a:r>
-              <a:rPr lang="en-US" b="1" dirty="0" smtClean="0">
-                <a:latin typeface="Arial" panose="020B0604020202020204" pitchFamily="34" charset="0"/>
-                <a:cs typeface="Arial" panose="020B0604020202020204" pitchFamily="34" charset="0"/>
-              </a:rPr>
-              <a:t>Báo</a:t>
-            </a:r>
-            <a:endParaRPr lang="en-US" b="1" dirty="0" smtClean="0">
-              <a:latin typeface="Arial" panose="020B0604020202020204" pitchFamily="34" charset="0"/>
-              <a:cs typeface="Arial" panose="020B0604020202020204" pitchFamily="34" charset="0"/>
-            </a:endParaRPr>
-          </a:p>
-        </p:txBody>
-      </p:sp>
-      <p:pic>
-        <p:nvPicPr>
-          <p:cNvPr id="24" name="Picture 23"/>
-          <p:cNvPicPr>
-            <a:picLocks noChangeAspect="1"/>
-          </p:cNvPicPr>
-          <p:nvPr/>
-        </p:nvPicPr>
-        <p:blipFill>
-          <a:blip r:embed="rId6">
-            <a:extLst>
-              <a:ext uri="{28A0092B-C50C-407E-A947-70E740481C1C}">
-                <a14:useLocalDpi xmlns:a14="http://schemas.microsoft.com/office/drawing/2010/main" val="0"/>
-              </a:ext>
-            </a:extLst>
-          </a:blip>
-          <a:stretch>
-            <a:fillRect/>
-          </a:stretch>
-        </p:blipFill>
-        <p:spPr>
-          <a:xfrm>
-            <a:off x="4563832" y="4147922"/>
-            <a:ext cx="1097280" cy="1097280"/>
-          </a:xfrm>
-          <a:prstGeom prst="rect">
-            <a:avLst/>
-          </a:prstGeom>
-          <a:solidFill>
-            <a:schemeClr val="tx1"/>
-          </a:solidFill>
-        </p:spPr>
-      </p:pic>
-      <p:pic>
-        <p:nvPicPr>
-          <p:cNvPr id="25" name="Picture 24"/>
-          <p:cNvPicPr>
-            <a:picLocks noChangeAspect="1"/>
-          </p:cNvPicPr>
-          <p:nvPr/>
-        </p:nvPicPr>
-        <p:blipFill>
-          <a:blip r:embed="rId7">
-            <a:extLst>
-              <a:ext uri="{28A0092B-C50C-407E-A947-70E740481C1C}">
-                <a14:useLocalDpi xmlns:a14="http://schemas.microsoft.com/office/drawing/2010/main" val="0"/>
-              </a:ext>
-            </a:extLst>
-          </a:blip>
-          <a:stretch>
-            <a:fillRect/>
-          </a:stretch>
-        </p:blipFill>
-        <p:spPr>
-          <a:xfrm>
-            <a:off x="8706564" y="4135857"/>
-            <a:ext cx="1097280" cy="1097280"/>
-          </a:xfrm>
-          <a:prstGeom prst="rect">
-            <a:avLst/>
-          </a:prstGeom>
-          <a:solidFill>
-            <a:schemeClr val="tx1"/>
-          </a:solidFill>
-        </p:spPr>
-      </p:pic>
-      <p:sp>
-        <p:nvSpPr>
-          <p:cNvPr id="40" name="TextBox 39"/>
-          <p:cNvSpPr txBox="1"/>
-          <p:nvPr/>
-        </p:nvSpPr>
-        <p:spPr>
-          <a:xfrm>
-            <a:off x="9811624" y="4118912"/>
-            <a:ext cx="2031325" cy="369332"/>
-          </a:xfrm>
-          <a:prstGeom prst="rect">
-            <a:avLst/>
-          </a:prstGeom>
-          <a:noFill/>
-        </p:spPr>
-        <p:txBody>
-          <a:bodyPr wrap="none" rtlCol="0">
-            <a:spAutoFit/>
-          </a:bodyPr>
-          <a:lstStyle/>
-          <a:p>
-            <a:r>
-              <a:rPr lang="en-US" b="1" dirty="0" smtClean="0">
-                <a:latin typeface="Arial" panose="020B0604020202020204" pitchFamily="34" charset="0"/>
-                <a:cs typeface="Arial" panose="020B0604020202020204" pitchFamily="34" charset="0"/>
-              </a:rPr>
-              <a:t>Đánh giá kết quả</a:t>
-            </a:r>
-            <a:endParaRPr lang="en-US" b="1" dirty="0">
-              <a:latin typeface="Arial" panose="020B0604020202020204" pitchFamily="34" charset="0"/>
-              <a:cs typeface="Arial" panose="020B0604020202020204" pitchFamily="34" charset="0"/>
-            </a:endParaRPr>
-          </a:p>
-        </p:txBody>
-      </p:sp>
     </p:spTree>
     <p:extLst>
       <p:ext uri="{BB962C8B-B14F-4D97-AF65-F5344CB8AC3E}">
-        <p14:creationId xmlns:p14="http://schemas.microsoft.com/office/powerpoint/2010/main" val="1425350224"/>
+        <p14:creationId xmlns:p14="http://schemas.microsoft.com/office/powerpoint/2010/main" val="2151670715"/>
       </p:ext>
     </p:extLst>
   </p:cSld>
@@ -8914,8 +9334,8 @@
         </p:nvSpPr>
         <p:spPr>
           <a:xfrm>
-            <a:off x="10222722" y="281927"/>
-            <a:ext cx="1282723" cy="523220"/>
+            <a:off x="7313271" y="160338"/>
+            <a:ext cx="4192174" cy="523220"/>
           </a:xfrm>
           <a:prstGeom prst="rect">
             <a:avLst/>
@@ -8934,7 +9354,7 @@
                 <a:latin typeface="Arial" panose="020B0604020202020204" pitchFamily="34" charset="0"/>
                 <a:cs typeface="Arial" panose="020B0604020202020204" pitchFamily="34" charset="0"/>
               </a:rPr>
-              <a:t>NHÓM</a:t>
+              <a:t>CÔNG NGHỆ SỬ DỤNG</a:t>
             </a:r>
             <a:endParaRPr lang="en-US" sz="2800" b="1" dirty="0">
               <a:latin typeface="Arial" panose="020B0604020202020204" pitchFamily="34" charset="0"/>
@@ -8945,50 +9365,83 @@
       </p:sp>
       <p:sp>
         <p:nvSpPr>
-          <p:cNvPr id="6" name="TextBox 5"/>
-          <p:cNvSpPr txBox="1"/>
+          <p:cNvPr id="3" name="AutoShape 2" descr="Download Free png Work Schedule, Vector Material, Schedules, Work ..."/>
+          <p:cNvSpPr>
+            <a:spLocks noChangeAspect="1" noChangeArrowheads="1"/>
+          </p:cNvSpPr>
           <p:nvPr/>
         </p:nvSpPr>
-        <p:spPr>
-          <a:xfrm>
-            <a:off x="855526" y="1060596"/>
-            <a:ext cx="1569660" cy="369332"/>
+        <p:spPr bwMode="auto">
+          <a:xfrm>
+            <a:off x="155575" y="-144463"/>
+            <a:ext cx="304800" cy="304801"/>
           </a:xfrm>
           <a:prstGeom prst="rect">
             <a:avLst/>
           </a:prstGeom>
           <a:noFill/>
-        </p:spPr>
-        <p:txBody>
-          <a:bodyPr wrap="none" rtlCol="0">
-            <a:spAutoFit/>
+          <a:extLst>
+            <a:ext uri="{909E8E84-426E-40DD-AFC4-6F175D3DCCD1}">
+              <a14:hiddenFill xmlns:a14="http://schemas.microsoft.com/office/drawing/2010/main">
+                <a:solidFill>
+                  <a:srgbClr val="FFFFFF"/>
+                </a:solidFill>
+              </a14:hiddenFill>
+            </a:ext>
+          </a:extLst>
+        </p:spPr>
+        <p:txBody>
+          <a:bodyPr vert="horz" wrap="square" lIns="91440" tIns="45720" rIns="91440" bIns="45720" numCol="1" anchor="t" anchorCtr="0" compatLnSpc="1">
+            <a:prstTxWarp prst="textNoShape">
+              <a:avLst/>
+            </a:prstTxWarp>
           </a:bodyPr>
           <a:lstStyle/>
           <a:p>
-            <a:r>
-              <a:rPr lang="en-US" b="1" dirty="0" smtClean="0">
-                <a:latin typeface="Arial" panose="020B0604020202020204" pitchFamily="34" charset="0"/>
-                <a:cs typeface="Arial" panose="020B0604020202020204" pitchFamily="34" charset="0"/>
-              </a:rPr>
-              <a:t>1. Tạo Nhóm</a:t>
-            </a:r>
-            <a:endParaRPr lang="en-US" b="1" dirty="0">
-              <a:latin typeface="Arial" panose="020B0604020202020204" pitchFamily="34" charset="0"/>
-              <a:cs typeface="Arial" panose="020B0604020202020204" pitchFamily="34" charset="0"/>
-            </a:endParaRPr>
-          </a:p>
-        </p:txBody>
-      </p:sp>
-      <p:sp>
-        <p:nvSpPr>
-          <p:cNvPr id="7" name="TextBox 6"/>
+            <a:endParaRPr lang="en-US"/>
+          </a:p>
+        </p:txBody>
+      </p:sp>
+      <p:pic>
+        <p:nvPicPr>
+          <p:cNvPr id="2" name="Picture 1"/>
+          <p:cNvPicPr>
+            <a:picLocks noChangeAspect="1"/>
+          </p:cNvPicPr>
+          <p:nvPr/>
+        </p:nvPicPr>
+        <p:blipFill>
+          <a:blip r:embed="rId2">
+            <a:extLst>
+              <a:ext uri="{28A0092B-C50C-407E-A947-70E740481C1C}">
+                <a14:useLocalDpi xmlns:a14="http://schemas.microsoft.com/office/drawing/2010/main" val="0"/>
+              </a:ext>
+            </a:extLst>
+          </a:blip>
+          <a:stretch>
+            <a:fillRect/>
+          </a:stretch>
+        </p:blipFill>
+        <p:spPr>
+          <a:xfrm>
+            <a:off x="6738831" y="1051559"/>
+            <a:ext cx="2138417" cy="1308110"/>
+          </a:xfrm>
+          <a:prstGeom prst="rect">
+            <a:avLst/>
+          </a:prstGeom>
+        </p:spPr>
+      </p:pic>
+      <p:sp>
+        <p:nvSpPr>
+          <p:cNvPr id="11" name="TextBox 10"/>
           <p:cNvSpPr txBox="1"/>
           <p:nvPr/>
         </p:nvSpPr>
         <p:spPr>
           <a:xfrm>
-            <a:off x="855526" y="1898796"/>
-            <a:ext cx="2360583" cy="369332"/>
+            <a:off x="8877248" y="2450015"/>
+            <a:ext cx="1902953" cy="523220"/>
           </a:xfrm>
           <a:prstGeom prst="rect">
             <a:avLst/>
@@ -8996,239 +9449,126 @@
           <a:noFill/>
         </p:spPr>
         <p:txBody>
-          <a:bodyPr wrap="none" rtlCol="0">
+          <a:bodyPr wrap="square" rtlCol="0">
             <a:spAutoFit/>
           </a:bodyPr>
           <a:lstStyle/>
           <a:p>
-            <a:r>
-              <a:rPr lang="en-US" b="1" dirty="0" smtClean="0">
+            <a:pPr algn="ctr"/>
+            <a:r>
+              <a:rPr lang="en-US" sz="2800" i="1" dirty="0" smtClean="0">
                 <a:latin typeface="Arial" panose="020B0604020202020204" pitchFamily="34" charset="0"/>
                 <a:cs typeface="Arial" panose="020B0604020202020204" pitchFamily="34" charset="0"/>
               </a:rPr>
-              <a:t>2. Thêm Thành Viên</a:t>
-            </a:r>
-            <a:endParaRPr lang="en-US" b="1" dirty="0">
+              <a:t>Express</a:t>
+            </a:r>
+            <a:endParaRPr lang="en-US" sz="2800" i="1" dirty="0">
               <a:latin typeface="Arial" panose="020B0604020202020204" pitchFamily="34" charset="0"/>
               <a:cs typeface="Arial" panose="020B0604020202020204" pitchFamily="34" charset="0"/>
             </a:endParaRPr>
           </a:p>
         </p:txBody>
       </p:sp>
-      <p:sp>
-        <p:nvSpPr>
-          <p:cNvPr id="3" name="Rounded Rectangle 2"/>
-          <p:cNvSpPr/>
+      <p:pic>
+        <p:nvPicPr>
+          <p:cNvPr id="7" name="Picture 6"/>
+          <p:cNvPicPr>
+            <a:picLocks noChangeAspect="1"/>
+          </p:cNvPicPr>
           <p:nvPr/>
-        </p:nvSpPr>
-        <p:spPr>
-          <a:xfrm>
-            <a:off x="1085850" y="2571748"/>
-            <a:ext cx="2039899" cy="726621"/>
-          </a:xfrm>
-          <a:prstGeom prst="roundRect">
+        </p:nvPicPr>
+        <p:blipFill>
+          <a:blip r:embed="rId3">
+            <a:extLst>
+              <a:ext uri="{28A0092B-C50C-407E-A947-70E740481C1C}">
+                <a14:useLocalDpi xmlns:a14="http://schemas.microsoft.com/office/drawing/2010/main" val="0"/>
+              </a:ext>
+            </a:extLst>
+          </a:blip>
+          <a:stretch>
+            <a:fillRect/>
+          </a:stretch>
+        </p:blipFill>
+        <p:spPr>
+          <a:xfrm>
+            <a:off x="6519383" y="2774247"/>
+            <a:ext cx="2357865" cy="2357865"/>
+          </a:xfrm>
+          <a:prstGeom prst="rect">
             <a:avLst/>
           </a:prstGeom>
         </p:spPr>
-        <p:style>
-          <a:lnRef idx="2">
-            <a:schemeClr val="accent1">
-              <a:shade val="50000"/>
-            </a:schemeClr>
-          </a:lnRef>
-          <a:fillRef idx="1">
-            <a:schemeClr val="accent1"/>
-          </a:fillRef>
-          <a:effectRef idx="0">
-            <a:schemeClr val="accent1"/>
-          </a:effectRef>
-          <a:fontRef idx="minor">
-            <a:schemeClr val="lt1"/>
-          </a:fontRef>
-        </p:style>
-        <p:txBody>
-          <a:bodyPr rtlCol="0" anchor="ctr"/>
-          <a:lstStyle/>
-          <a:p>
-            <a:pPr algn="ctr"/>
-            <a:r>
-              <a:rPr lang="en-US" dirty="0" smtClean="0"/>
-              <a:t>Nhập Tên/ Email</a:t>
-            </a:r>
-            <a:endParaRPr lang="en-US" dirty="0"/>
-          </a:p>
-        </p:txBody>
-      </p:sp>
-      <p:sp>
-        <p:nvSpPr>
-          <p:cNvPr id="8" name="Rounded Rectangle 7"/>
-          <p:cNvSpPr/>
+      </p:pic>
+      <p:pic>
+        <p:nvPicPr>
+          <p:cNvPr id="8" name="Picture 7"/>
+          <p:cNvPicPr>
+            <a:picLocks noChangeAspect="1"/>
+          </p:cNvPicPr>
           <p:nvPr/>
-        </p:nvSpPr>
-        <p:spPr>
-          <a:xfrm>
-            <a:off x="3469200" y="2571748"/>
-            <a:ext cx="1927391" cy="726621"/>
-          </a:xfrm>
-          <a:prstGeom prst="roundRect">
+        </p:nvPicPr>
+        <p:blipFill>
+          <a:blip r:embed="rId4">
+            <a:extLst>
+              <a:ext uri="{28A0092B-C50C-407E-A947-70E740481C1C}">
+                <a14:useLocalDpi xmlns:a14="http://schemas.microsoft.com/office/drawing/2010/main" val="0"/>
+              </a:ext>
+            </a:extLst>
+          </a:blip>
+          <a:stretch>
+            <a:fillRect/>
+          </a:stretch>
+        </p:blipFill>
+        <p:spPr>
+          <a:xfrm>
+            <a:off x="8990027" y="4333871"/>
+            <a:ext cx="1677394" cy="811642"/>
+          </a:xfrm>
+          <a:prstGeom prst="rect">
             <a:avLst/>
           </a:prstGeom>
         </p:spPr>
-        <p:style>
-          <a:lnRef idx="2">
-            <a:schemeClr val="accent1">
-              <a:shade val="50000"/>
-            </a:schemeClr>
-          </a:lnRef>
-          <a:fillRef idx="1">
-            <a:schemeClr val="accent1"/>
-          </a:fillRef>
-          <a:effectRef idx="0">
-            <a:schemeClr val="accent1"/>
-          </a:effectRef>
-          <a:fontRef idx="minor">
-            <a:schemeClr val="lt1"/>
-          </a:fontRef>
-        </p:style>
-        <p:txBody>
-          <a:bodyPr rtlCol="0" anchor="ctr"/>
-          <a:lstStyle/>
-          <a:p>
-            <a:pPr algn="ctr"/>
-            <a:r>
-              <a:rPr lang="en-US" dirty="0" smtClean="0"/>
-              <a:t>Chọn Người Muốn Thêm</a:t>
-            </a:r>
-            <a:endParaRPr lang="en-US" dirty="0"/>
-          </a:p>
-        </p:txBody>
-      </p:sp>
-      <p:sp>
-        <p:nvSpPr>
-          <p:cNvPr id="9" name="Rounded Rectangle 8"/>
-          <p:cNvSpPr/>
+      </p:pic>
+      <p:pic>
+        <p:nvPicPr>
+          <p:cNvPr id="14" name="Picture 13"/>
+          <p:cNvPicPr>
+            <a:picLocks noChangeAspect="1"/>
+          </p:cNvPicPr>
           <p:nvPr/>
-        </p:nvSpPr>
-        <p:spPr>
-          <a:xfrm>
-            <a:off x="5740042" y="2571748"/>
-            <a:ext cx="1927391" cy="726621"/>
-          </a:xfrm>
-          <a:prstGeom prst="roundRect">
+        </p:nvPicPr>
+        <p:blipFill>
+          <a:blip r:embed="rId5">
+            <a:extLst>
+              <a:ext uri="{28A0092B-C50C-407E-A947-70E740481C1C}">
+                <a14:useLocalDpi xmlns:a14="http://schemas.microsoft.com/office/drawing/2010/main" val="0"/>
+              </a:ext>
+            </a:extLst>
+          </a:blip>
+          <a:stretch>
+            <a:fillRect/>
+          </a:stretch>
+        </p:blipFill>
+        <p:spPr>
+          <a:xfrm>
+            <a:off x="7275119" y="5381456"/>
+            <a:ext cx="1074199" cy="1074199"/>
+          </a:xfrm>
+          <a:prstGeom prst="rect">
             <a:avLst/>
           </a:prstGeom>
         </p:spPr>
-        <p:style>
-          <a:lnRef idx="2">
-            <a:schemeClr val="accent1">
-              <a:shade val="50000"/>
-            </a:schemeClr>
-          </a:lnRef>
-          <a:fillRef idx="1">
-            <a:schemeClr val="accent1"/>
-          </a:fillRef>
-          <a:effectRef idx="0">
-            <a:schemeClr val="accent1"/>
-          </a:effectRef>
-          <a:fontRef idx="minor">
-            <a:schemeClr val="lt1"/>
-          </a:fontRef>
-        </p:style>
-        <p:txBody>
-          <a:bodyPr rtlCol="0" anchor="ctr"/>
-          <a:lstStyle/>
-          <a:p>
-            <a:pPr algn="ctr"/>
-            <a:r>
-              <a:rPr lang="en-US" dirty="0" smtClean="0"/>
-              <a:t>Thành Viên Mới Gia Nhập</a:t>
-            </a:r>
-            <a:endParaRPr lang="en-US" dirty="0"/>
-          </a:p>
-        </p:txBody>
-      </p:sp>
-      <p:cxnSp>
-        <p:nvCxnSpPr>
-          <p:cNvPr id="11" name="Straight Arrow Connector 10"/>
-          <p:cNvCxnSpPr>
-            <a:stCxn id="3" idx="3"/>
-            <a:endCxn id="8" idx="1"/>
-          </p:cNvCxnSpPr>
-          <p:nvPr/>
-        </p:nvCxnSpPr>
-        <p:spPr>
-          <a:xfrm>
-            <a:off x="3125749" y="2935059"/>
-            <a:ext cx="343451" cy="0"/>
-          </a:xfrm>
-          <a:prstGeom prst="straightConnector1">
-            <a:avLst/>
-          </a:prstGeom>
-          <a:ln>
-            <a:tailEnd type="triangle"/>
-          </a:ln>
-        </p:spPr>
-        <p:style>
-          <a:lnRef idx="2">
-            <a:schemeClr val="dk1"/>
-          </a:lnRef>
-          <a:fillRef idx="0">
-            <a:schemeClr val="dk1"/>
-          </a:fillRef>
-          <a:effectRef idx="1">
-            <a:schemeClr val="dk1"/>
-          </a:effectRef>
-          <a:fontRef idx="minor">
-            <a:schemeClr val="tx1"/>
-          </a:fontRef>
-        </p:style>
-      </p:cxnSp>
-      <p:cxnSp>
-        <p:nvCxnSpPr>
-          <p:cNvPr id="13" name="Straight Arrow Connector 12"/>
-          <p:cNvCxnSpPr>
-            <a:stCxn id="8" idx="3"/>
-            <a:endCxn id="9" idx="1"/>
-          </p:cNvCxnSpPr>
-          <p:nvPr/>
-        </p:nvCxnSpPr>
-        <p:spPr>
-          <a:xfrm>
-            <a:off x="5396591" y="2935059"/>
-            <a:ext cx="343451" cy="0"/>
-          </a:xfrm>
-          <a:prstGeom prst="straightConnector1">
-            <a:avLst/>
-          </a:prstGeom>
-          <a:ln>
-            <a:tailEnd type="triangle"/>
-          </a:ln>
-        </p:spPr>
-        <p:style>
-          <a:lnRef idx="2">
-            <a:schemeClr val="dk1"/>
-          </a:lnRef>
-          <a:fillRef idx="0">
-            <a:schemeClr val="dk1"/>
-          </a:fillRef>
-          <a:effectRef idx="1">
-            <a:schemeClr val="dk1"/>
-          </a:effectRef>
-          <a:fontRef idx="minor">
-            <a:schemeClr val="tx1"/>
-          </a:fontRef>
-        </p:style>
-      </p:cxnSp>
-      <p:sp>
-        <p:nvSpPr>
-          <p:cNvPr id="14" name="TextBox 13"/>
+      </p:pic>
+      <p:sp>
+        <p:nvSpPr>
+          <p:cNvPr id="16" name="TextBox 15"/>
           <p:cNvSpPr txBox="1"/>
           <p:nvPr/>
         </p:nvSpPr>
         <p:spPr>
           <a:xfrm>
-            <a:off x="1122997" y="3324990"/>
-            <a:ext cx="1965603" cy="276999"/>
+            <a:off x="8191448" y="5986790"/>
+            <a:ext cx="1902953" cy="523220"/>
           </a:xfrm>
           <a:prstGeom prst="rect">
             <a:avLst/>
@@ -9236,485 +9576,180 @@
           <a:noFill/>
         </p:spPr>
         <p:txBody>
-          <a:bodyPr wrap="none" rtlCol="0">
+          <a:bodyPr wrap="square" rtlCol="0">
             <a:spAutoFit/>
           </a:bodyPr>
           <a:lstStyle/>
           <a:p>
-            <a:r>
-              <a:rPr lang="en-US" sz="1200" b="1" dirty="0" smtClean="0">
-                <a:solidFill>
-                  <a:schemeClr val="tx1">
-                    <a:lumMod val="85000"/>
-                  </a:schemeClr>
-                </a:solidFill>
+            <a:pPr algn="ctr"/>
+            <a:r>
+              <a:rPr lang="en-US" sz="2800" i="1" dirty="0" smtClean="0">
                 <a:latin typeface="Arial" panose="020B0604020202020204" pitchFamily="34" charset="0"/>
                 <a:cs typeface="Arial" panose="020B0604020202020204" pitchFamily="34" charset="0"/>
               </a:rPr>
-              <a:t>Thành Viên Trong Nhóm</a:t>
-            </a:r>
-            <a:endParaRPr lang="en-US" sz="1200" b="1" dirty="0">
-              <a:solidFill>
-                <a:schemeClr val="tx1">
-                  <a:lumMod val="85000"/>
-                </a:schemeClr>
-              </a:solidFill>
+              <a:t>Socket.io</a:t>
+            </a:r>
+            <a:endParaRPr lang="en-US" sz="2800" i="1" dirty="0">
               <a:latin typeface="Arial" panose="020B0604020202020204" pitchFamily="34" charset="0"/>
               <a:cs typeface="Arial" panose="020B0604020202020204" pitchFamily="34" charset="0"/>
             </a:endParaRPr>
           </a:p>
         </p:txBody>
       </p:sp>
-      <p:sp>
-        <p:nvSpPr>
-          <p:cNvPr id="15" name="TextBox 14"/>
-          <p:cNvSpPr txBox="1"/>
+      <p:pic>
+        <p:nvPicPr>
+          <p:cNvPr id="19" name="Picture 18"/>
+          <p:cNvPicPr>
+            <a:picLocks noChangeAspect="1"/>
+          </p:cNvPicPr>
           <p:nvPr/>
-        </p:nvSpPr>
-        <p:spPr>
-          <a:xfrm>
-            <a:off x="855526" y="3903098"/>
-            <a:ext cx="2475999" cy="369332"/>
+        </p:nvPicPr>
+        <p:blipFill>
+          <a:blip r:embed="rId6">
+            <a:extLst>
+              <a:ext uri="{28A0092B-C50C-407E-A947-70E740481C1C}">
+                <a14:useLocalDpi xmlns:a14="http://schemas.microsoft.com/office/drawing/2010/main" val="0"/>
+              </a:ext>
+            </a:extLst>
+          </a:blip>
+          <a:stretch>
+            <a:fillRect/>
+          </a:stretch>
+        </p:blipFill>
+        <p:spPr>
+          <a:xfrm>
+            <a:off x="3373344" y="4299125"/>
+            <a:ext cx="1279350" cy="1279350"/>
           </a:xfrm>
           <a:prstGeom prst="rect">
             <a:avLst/>
           </a:prstGeom>
-          <a:noFill/>
-        </p:spPr>
-        <p:txBody>
-          <a:bodyPr wrap="none" rtlCol="0">
-            <a:spAutoFit/>
-          </a:bodyPr>
-          <a:lstStyle/>
-          <a:p>
-            <a:r>
-              <a:rPr lang="en-US" b="1" dirty="0" smtClean="0">
-                <a:latin typeface="Arial" panose="020B0604020202020204" pitchFamily="34" charset="0"/>
-                <a:cs typeface="Arial" panose="020B0604020202020204" pitchFamily="34" charset="0"/>
-              </a:rPr>
-              <a:t>3. Yêu Cầu Tham Gia</a:t>
-            </a:r>
-            <a:endParaRPr lang="en-US" b="1" dirty="0">
-              <a:latin typeface="Arial" panose="020B0604020202020204" pitchFamily="34" charset="0"/>
-              <a:cs typeface="Arial" panose="020B0604020202020204" pitchFamily="34" charset="0"/>
-            </a:endParaRPr>
-          </a:p>
-        </p:txBody>
-      </p:sp>
-      <p:sp>
-        <p:nvSpPr>
-          <p:cNvPr id="16" name="Rounded Rectangle 15"/>
-          <p:cNvSpPr/>
+        </p:spPr>
+      </p:pic>
+      <p:pic>
+        <p:nvPicPr>
+          <p:cNvPr id="21" name="Picture 20"/>
+          <p:cNvPicPr>
+            <a:picLocks noChangeAspect="1"/>
+          </p:cNvPicPr>
           <p:nvPr/>
-        </p:nvSpPr>
-        <p:spPr>
-          <a:xfrm>
-            <a:off x="1085850" y="4588966"/>
-            <a:ext cx="2039899" cy="726621"/>
-          </a:xfrm>
-          <a:prstGeom prst="roundRect">
-            <a:avLst/>
-          </a:prstGeom>
-        </p:spPr>
-        <p:style>
-          <a:lnRef idx="2">
-            <a:schemeClr val="accent1">
-              <a:shade val="50000"/>
-            </a:schemeClr>
-          </a:lnRef>
-          <a:fillRef idx="1">
-            <a:schemeClr val="accent1"/>
-          </a:fillRef>
-          <a:effectRef idx="0">
-            <a:schemeClr val="accent1"/>
-          </a:effectRef>
-          <a:fontRef idx="minor">
-            <a:schemeClr val="lt1"/>
-          </a:fontRef>
-        </p:style>
-        <p:txBody>
-          <a:bodyPr rtlCol="0" anchor="ctr"/>
-          <a:lstStyle/>
-          <a:p>
-            <a:pPr algn="ctr"/>
-            <a:r>
-              <a:rPr lang="en-US" dirty="0" smtClean="0"/>
-              <a:t>Tìm Nhóm Theo Tên</a:t>
-            </a:r>
-            <a:endParaRPr lang="en-US" dirty="0"/>
-          </a:p>
-        </p:txBody>
-      </p:sp>
-      <p:sp>
-        <p:nvSpPr>
-          <p:cNvPr id="17" name="Rounded Rectangle 16"/>
-          <p:cNvSpPr/>
-          <p:nvPr/>
-        </p:nvSpPr>
-        <p:spPr>
-          <a:xfrm>
-            <a:off x="3469200" y="4588966"/>
-            <a:ext cx="1927391" cy="726621"/>
-          </a:xfrm>
-          <a:prstGeom prst="roundRect">
-            <a:avLst/>
-          </a:prstGeom>
-        </p:spPr>
-        <p:style>
-          <a:lnRef idx="2">
-            <a:schemeClr val="accent1">
-              <a:shade val="50000"/>
-            </a:schemeClr>
-          </a:lnRef>
-          <a:fillRef idx="1">
-            <a:schemeClr val="accent1"/>
-          </a:fillRef>
-          <a:effectRef idx="0">
-            <a:schemeClr val="accent1"/>
-          </a:effectRef>
-          <a:fontRef idx="minor">
-            <a:schemeClr val="lt1"/>
-          </a:fontRef>
-        </p:style>
-        <p:txBody>
-          <a:bodyPr rtlCol="0" anchor="ctr"/>
-          <a:lstStyle/>
-          <a:p>
-            <a:pPr algn="ctr"/>
-            <a:r>
-              <a:rPr lang="en-US" dirty="0" smtClean="0"/>
-              <a:t>Chọn Nhóm</a:t>
-            </a:r>
-            <a:endParaRPr lang="en-US" dirty="0"/>
-          </a:p>
-        </p:txBody>
-      </p:sp>
-      <p:sp>
-        <p:nvSpPr>
-          <p:cNvPr id="18" name="Rounded Rectangle 17"/>
-          <p:cNvSpPr/>
-          <p:nvPr/>
-        </p:nvSpPr>
-        <p:spPr>
-          <a:xfrm>
-            <a:off x="5740042" y="4588966"/>
-            <a:ext cx="1927391" cy="726621"/>
-          </a:xfrm>
-          <a:prstGeom prst="roundRect">
-            <a:avLst/>
-          </a:prstGeom>
-        </p:spPr>
-        <p:style>
-          <a:lnRef idx="2">
-            <a:schemeClr val="accent1">
-              <a:shade val="50000"/>
-            </a:schemeClr>
-          </a:lnRef>
-          <a:fillRef idx="1">
-            <a:schemeClr val="accent1"/>
-          </a:fillRef>
-          <a:effectRef idx="0">
-            <a:schemeClr val="accent1"/>
-          </a:effectRef>
-          <a:fontRef idx="minor">
-            <a:schemeClr val="lt1"/>
-          </a:fontRef>
-        </p:style>
-        <p:txBody>
-          <a:bodyPr rtlCol="0" anchor="ctr"/>
-          <a:lstStyle/>
-          <a:p>
-            <a:pPr algn="ctr"/>
-            <a:r>
-              <a:rPr lang="en-US" dirty="0" smtClean="0"/>
-              <a:t>Thông Báo Có Yêu Cầu Mới</a:t>
-            </a:r>
-            <a:endParaRPr lang="en-US" dirty="0"/>
-          </a:p>
-        </p:txBody>
-      </p:sp>
-      <p:cxnSp>
-        <p:nvCxnSpPr>
-          <p:cNvPr id="19" name="Straight Arrow Connector 18"/>
-          <p:cNvCxnSpPr>
-            <a:stCxn id="16" idx="3"/>
-            <a:endCxn id="17" idx="1"/>
-          </p:cNvCxnSpPr>
-          <p:nvPr/>
-        </p:nvCxnSpPr>
-        <p:spPr>
-          <a:xfrm>
-            <a:off x="3125749" y="4952277"/>
-            <a:ext cx="343451" cy="0"/>
-          </a:xfrm>
-          <a:prstGeom prst="straightConnector1">
-            <a:avLst/>
-          </a:prstGeom>
-          <a:ln>
-            <a:tailEnd type="triangle"/>
-          </a:ln>
-        </p:spPr>
-        <p:style>
-          <a:lnRef idx="2">
-            <a:schemeClr val="dk1"/>
-          </a:lnRef>
-          <a:fillRef idx="0">
-            <a:schemeClr val="dk1"/>
-          </a:fillRef>
-          <a:effectRef idx="1">
-            <a:schemeClr val="dk1"/>
-          </a:effectRef>
-          <a:fontRef idx="minor">
-            <a:schemeClr val="tx1"/>
-          </a:fontRef>
-        </p:style>
-      </p:cxnSp>
-      <p:cxnSp>
-        <p:nvCxnSpPr>
-          <p:cNvPr id="22" name="Straight Arrow Connector 21"/>
-          <p:cNvCxnSpPr>
-            <a:stCxn id="18" idx="3"/>
-            <a:endCxn id="25" idx="1"/>
-          </p:cNvCxnSpPr>
-          <p:nvPr/>
-        </p:nvCxnSpPr>
-        <p:spPr>
-          <a:xfrm>
-            <a:off x="7667433" y="4952277"/>
-            <a:ext cx="343451" cy="0"/>
-          </a:xfrm>
-          <a:prstGeom prst="straightConnector1">
-            <a:avLst/>
-          </a:prstGeom>
-          <a:ln>
-            <a:tailEnd type="triangle"/>
-          </a:ln>
-        </p:spPr>
-        <p:style>
-          <a:lnRef idx="2">
-            <a:schemeClr val="dk1"/>
-          </a:lnRef>
-          <a:fillRef idx="0">
-            <a:schemeClr val="dk1"/>
-          </a:fillRef>
-          <a:effectRef idx="1">
-            <a:schemeClr val="dk1"/>
-          </a:effectRef>
-          <a:fontRef idx="minor">
-            <a:schemeClr val="tx1"/>
-          </a:fontRef>
-        </p:style>
-      </p:cxnSp>
-      <p:sp>
-        <p:nvSpPr>
-          <p:cNvPr id="25" name="Rounded Rectangle 24"/>
-          <p:cNvSpPr/>
-          <p:nvPr/>
-        </p:nvSpPr>
-        <p:spPr>
-          <a:xfrm>
-            <a:off x="8010884" y="4588966"/>
-            <a:ext cx="1927391" cy="726621"/>
-          </a:xfrm>
-          <a:prstGeom prst="roundRect">
-            <a:avLst/>
-          </a:prstGeom>
-        </p:spPr>
-        <p:style>
-          <a:lnRef idx="2">
-            <a:schemeClr val="accent1">
-              <a:shade val="50000"/>
-            </a:schemeClr>
-          </a:lnRef>
-          <a:fillRef idx="1">
-            <a:schemeClr val="accent1"/>
-          </a:fillRef>
-          <a:effectRef idx="0">
-            <a:schemeClr val="accent1"/>
-          </a:effectRef>
-          <a:fontRef idx="minor">
-            <a:schemeClr val="lt1"/>
-          </a:fontRef>
-        </p:style>
-        <p:txBody>
-          <a:bodyPr rtlCol="0" anchor="ctr"/>
-          <a:lstStyle/>
-          <a:p>
-            <a:pPr algn="ctr"/>
-            <a:r>
-              <a:rPr lang="en-US" dirty="0" smtClean="0"/>
-              <a:t>Đồng Ý</a:t>
-            </a:r>
-            <a:endParaRPr lang="en-US" dirty="0"/>
-          </a:p>
-        </p:txBody>
-      </p:sp>
-      <p:cxnSp>
-        <p:nvCxnSpPr>
-          <p:cNvPr id="35" name="Straight Arrow Connector 34"/>
-          <p:cNvCxnSpPr>
-            <a:stCxn id="17" idx="3"/>
-            <a:endCxn id="18" idx="1"/>
-          </p:cNvCxnSpPr>
-          <p:nvPr/>
-        </p:nvCxnSpPr>
-        <p:spPr>
-          <a:xfrm>
-            <a:off x="5396591" y="4952277"/>
-            <a:ext cx="343451" cy="0"/>
-          </a:xfrm>
-          <a:prstGeom prst="straightConnector1">
-            <a:avLst/>
-          </a:prstGeom>
-          <a:ln>
-            <a:tailEnd type="triangle"/>
-          </a:ln>
-        </p:spPr>
-        <p:style>
-          <a:lnRef idx="2">
-            <a:schemeClr val="dk1"/>
-          </a:lnRef>
-          <a:fillRef idx="0">
-            <a:schemeClr val="dk1"/>
-          </a:fillRef>
-          <a:effectRef idx="1">
-            <a:schemeClr val="dk1"/>
-          </a:effectRef>
-          <a:fontRef idx="minor">
-            <a:schemeClr val="tx1"/>
-          </a:fontRef>
-        </p:style>
-      </p:cxnSp>
-      <p:sp>
-        <p:nvSpPr>
-          <p:cNvPr id="39" name="Rounded Rectangle 38"/>
-          <p:cNvSpPr/>
-          <p:nvPr/>
-        </p:nvSpPr>
-        <p:spPr>
-          <a:xfrm>
-            <a:off x="8010884" y="5678898"/>
-            <a:ext cx="1927391" cy="726621"/>
-          </a:xfrm>
-          <a:prstGeom prst="roundRect">
-            <a:avLst/>
-          </a:prstGeom>
-        </p:spPr>
-        <p:style>
-          <a:lnRef idx="2">
-            <a:schemeClr val="accent1">
-              <a:shade val="50000"/>
-            </a:schemeClr>
-          </a:lnRef>
-          <a:fillRef idx="1">
-            <a:schemeClr val="accent1"/>
-          </a:fillRef>
-          <a:effectRef idx="0">
-            <a:schemeClr val="accent1"/>
-          </a:effectRef>
-          <a:fontRef idx="minor">
-            <a:schemeClr val="lt1"/>
-          </a:fontRef>
-        </p:style>
-        <p:txBody>
-          <a:bodyPr rtlCol="0" anchor="ctr"/>
-          <a:lstStyle/>
-          <a:p>
-            <a:pPr algn="ctr"/>
-            <a:r>
-              <a:rPr lang="en-US" dirty="0" smtClean="0"/>
-              <a:t>Cầu Được Chấp Nhận</a:t>
-            </a:r>
-            <a:endParaRPr lang="en-US" dirty="0"/>
-          </a:p>
-        </p:txBody>
-      </p:sp>
-      <p:cxnSp>
-        <p:nvCxnSpPr>
-          <p:cNvPr id="40" name="Straight Arrow Connector 39"/>
-          <p:cNvCxnSpPr>
-            <a:stCxn id="25" idx="2"/>
-            <a:endCxn id="39" idx="0"/>
-          </p:cNvCxnSpPr>
-          <p:nvPr/>
-        </p:nvCxnSpPr>
-        <p:spPr>
-          <a:xfrm>
-            <a:off x="8974580" y="5315587"/>
-            <a:ext cx="0" cy="363311"/>
-          </a:xfrm>
-          <a:prstGeom prst="straightConnector1">
-            <a:avLst/>
-          </a:prstGeom>
-          <a:ln>
-            <a:tailEnd type="triangle"/>
-          </a:ln>
-        </p:spPr>
-        <p:style>
-          <a:lnRef idx="2">
-            <a:schemeClr val="dk1"/>
-          </a:lnRef>
-          <a:fillRef idx="0">
-            <a:schemeClr val="dk1"/>
-          </a:fillRef>
-          <a:effectRef idx="1">
-            <a:schemeClr val="dk1"/>
-          </a:effectRef>
-          <a:fontRef idx="minor">
-            <a:schemeClr val="tx1"/>
-          </a:fontRef>
-        </p:style>
-      </p:cxnSp>
-      <p:sp>
-        <p:nvSpPr>
-          <p:cNvPr id="44" name="TextBox 43"/>
-          <p:cNvSpPr txBox="1"/>
-          <p:nvPr/>
-        </p:nvSpPr>
-        <p:spPr>
-          <a:xfrm>
-            <a:off x="1085850" y="5401899"/>
-            <a:ext cx="2204450" cy="276999"/>
+        </p:nvPicPr>
+        <p:blipFill>
+          <a:blip r:embed="rId7">
+            <a:extLst>
+              <a:ext uri="{28A0092B-C50C-407E-A947-70E740481C1C}">
+                <a14:useLocalDpi xmlns:a14="http://schemas.microsoft.com/office/drawing/2010/main" val="0"/>
+              </a:ext>
+            </a:extLst>
+          </a:blip>
+          <a:stretch>
+            <a:fillRect/>
+          </a:stretch>
+        </p:blipFill>
+        <p:spPr>
+          <a:xfrm>
+            <a:off x="1381178" y="4102169"/>
+            <a:ext cx="1245714" cy="1273891"/>
           </a:xfrm>
           <a:prstGeom prst="rect">
             <a:avLst/>
           </a:prstGeom>
-          <a:noFill/>
-        </p:spPr>
-        <p:txBody>
-          <a:bodyPr wrap="none" rtlCol="0">
-            <a:spAutoFit/>
-          </a:bodyPr>
-          <a:lstStyle/>
-          <a:p>
-            <a:r>
-              <a:rPr lang="en-US" sz="1200" b="1" dirty="0" smtClean="0">
-                <a:solidFill>
-                  <a:schemeClr val="tx1">
-                    <a:lumMod val="85000"/>
-                  </a:schemeClr>
-                </a:solidFill>
-                <a:latin typeface="Arial" panose="020B0604020202020204" pitchFamily="34" charset="0"/>
-                <a:cs typeface="Arial" panose="020B0604020202020204" pitchFamily="34" charset="0"/>
-              </a:rPr>
-              <a:t>User Muốn Tham Gia Nhóm</a:t>
-            </a:r>
-            <a:endParaRPr lang="en-US" sz="1200" b="1" dirty="0">
-              <a:solidFill>
-                <a:schemeClr val="tx1">
-                  <a:lumMod val="85000"/>
-                </a:schemeClr>
-              </a:solidFill>
-              <a:latin typeface="Arial" panose="020B0604020202020204" pitchFamily="34" charset="0"/>
-              <a:cs typeface="Arial" panose="020B0604020202020204" pitchFamily="34" charset="0"/>
-            </a:endParaRPr>
-          </a:p>
-        </p:txBody>
-      </p:sp>
+        </p:spPr>
+      </p:pic>
+      <p:pic>
+        <p:nvPicPr>
+          <p:cNvPr id="22" name="Picture 21"/>
+          <p:cNvPicPr>
+            <a:picLocks noChangeAspect="1"/>
+          </p:cNvPicPr>
+          <p:nvPr/>
+        </p:nvPicPr>
+        <p:blipFill>
+          <a:blip r:embed="rId8">
+            <a:extLst>
+              <a:ext uri="{28A0092B-C50C-407E-A947-70E740481C1C}">
+                <a14:useLocalDpi xmlns:a14="http://schemas.microsoft.com/office/drawing/2010/main" val="0"/>
+              </a:ext>
+            </a:extLst>
+          </a:blip>
+          <a:stretch>
+            <a:fillRect/>
+          </a:stretch>
+        </p:blipFill>
+        <p:spPr>
+          <a:xfrm>
+            <a:off x="1059544" y="1204849"/>
+            <a:ext cx="2579799" cy="1102864"/>
+          </a:xfrm>
+          <a:prstGeom prst="rect">
+            <a:avLst/>
+          </a:prstGeom>
+        </p:spPr>
+      </p:pic>
+      <p:pic>
+        <p:nvPicPr>
+          <p:cNvPr id="23" name="Picture 22"/>
+          <p:cNvPicPr>
+            <a:picLocks noChangeAspect="1"/>
+          </p:cNvPicPr>
+          <p:nvPr/>
+        </p:nvPicPr>
+        <p:blipFill>
+          <a:blip r:embed="rId9">
+            <a:extLst>
+              <a:ext uri="{28A0092B-C50C-407E-A947-70E740481C1C}">
+                <a14:useLocalDpi xmlns:a14="http://schemas.microsoft.com/office/drawing/2010/main" val="0"/>
+              </a:ext>
+            </a:extLst>
+          </a:blip>
+          <a:stretch>
+            <a:fillRect/>
+          </a:stretch>
+        </p:blipFill>
+        <p:spPr>
+          <a:xfrm>
+            <a:off x="3901904" y="1094293"/>
+            <a:ext cx="1323975" cy="1323975"/>
+          </a:xfrm>
+          <a:prstGeom prst="rect">
+            <a:avLst/>
+          </a:prstGeom>
+        </p:spPr>
+      </p:pic>
+      <p:pic>
+        <p:nvPicPr>
+          <p:cNvPr id="24" name="Picture 23"/>
+          <p:cNvPicPr>
+            <a:picLocks noChangeAspect="1"/>
+          </p:cNvPicPr>
+          <p:nvPr/>
+        </p:nvPicPr>
+        <p:blipFill>
+          <a:blip r:embed="rId10">
+            <a:extLst>
+              <a:ext uri="{28A0092B-C50C-407E-A947-70E740481C1C}">
+                <a14:useLocalDpi xmlns:a14="http://schemas.microsoft.com/office/drawing/2010/main" val="0"/>
+              </a:ext>
+            </a:extLst>
+          </a:blip>
+          <a:stretch>
+            <a:fillRect/>
+          </a:stretch>
+        </p:blipFill>
+        <p:spPr>
+          <a:xfrm>
+            <a:off x="2626892" y="2506310"/>
+            <a:ext cx="1571625" cy="1571625"/>
+          </a:xfrm>
+          <a:prstGeom prst="rect">
+            <a:avLst/>
+          </a:prstGeom>
+        </p:spPr>
+      </p:pic>
     </p:spTree>
     <p:extLst>
       <p:ext uri="{BB962C8B-B14F-4D97-AF65-F5344CB8AC3E}">
-        <p14:creationId xmlns:p14="http://schemas.microsoft.com/office/powerpoint/2010/main" val="2151670715"/>
+        <p14:creationId xmlns:p14="http://schemas.microsoft.com/office/powerpoint/2010/main" val="802297981"/>
       </p:ext>
     </p:extLst>
   </p:cSld>
@@ -9796,781 +9831,13 @@
           <a:p>
             <a:pPr algn="r"/>
             <a:r>
-              <a:rPr lang="en-US" sz="2800" b="1" smtClean="0">
+              <a:rPr lang="en-US" sz="2800" b="1" dirty="0" smtClean="0">
                 <a:latin typeface="Arial" panose="020B0604020202020204" pitchFamily="34" charset="0"/>
                 <a:cs typeface="Arial" panose="020B0604020202020204" pitchFamily="34" charset="0"/>
               </a:rPr>
               <a:t>BẢNG + CÔNG VIỆC</a:t>
             </a:r>
             <a:endParaRPr lang="en-US" sz="2800" b="1" dirty="0">
-              <a:latin typeface="Arial" panose="020B0604020202020204" pitchFamily="34" charset="0"/>
-              <a:cs typeface="Arial" panose="020B0604020202020204" pitchFamily="34" charset="0"/>
-            </a:endParaRPr>
-          </a:p>
-        </p:txBody>
-      </p:sp>
-      <p:sp>
-        <p:nvSpPr>
-          <p:cNvPr id="6" name="TextBox 5"/>
-          <p:cNvSpPr txBox="1"/>
-          <p:nvPr/>
-        </p:nvSpPr>
-        <p:spPr>
-          <a:xfrm>
-            <a:off x="855526" y="1060596"/>
-            <a:ext cx="1569660" cy="369332"/>
-          </a:xfrm>
-          <a:prstGeom prst="rect">
-            <a:avLst/>
-          </a:prstGeom>
-          <a:noFill/>
-        </p:spPr>
-        <p:txBody>
-          <a:bodyPr wrap="none" rtlCol="0">
-            <a:spAutoFit/>
-          </a:bodyPr>
-          <a:lstStyle/>
-          <a:p>
-            <a:r>
-              <a:rPr lang="en-US" b="1" dirty="0" smtClean="0">
-                <a:latin typeface="Arial" panose="020B0604020202020204" pitchFamily="34" charset="0"/>
-                <a:cs typeface="Arial" panose="020B0604020202020204" pitchFamily="34" charset="0"/>
-              </a:rPr>
-              <a:t>1. Tạo Nhóm</a:t>
-            </a:r>
-            <a:endParaRPr lang="en-US" b="1" dirty="0">
-              <a:latin typeface="Arial" panose="020B0604020202020204" pitchFamily="34" charset="0"/>
-              <a:cs typeface="Arial" panose="020B0604020202020204" pitchFamily="34" charset="0"/>
-            </a:endParaRPr>
-          </a:p>
-        </p:txBody>
-      </p:sp>
-      <p:sp>
-        <p:nvSpPr>
-          <p:cNvPr id="7" name="TextBox 6"/>
-          <p:cNvSpPr txBox="1"/>
-          <p:nvPr/>
-        </p:nvSpPr>
-        <p:spPr>
-          <a:xfrm>
-            <a:off x="855526" y="1898796"/>
-            <a:ext cx="2360583" cy="369332"/>
-          </a:xfrm>
-          <a:prstGeom prst="rect">
-            <a:avLst/>
-          </a:prstGeom>
-          <a:noFill/>
-        </p:spPr>
-        <p:txBody>
-          <a:bodyPr wrap="none" rtlCol="0">
-            <a:spAutoFit/>
-          </a:bodyPr>
-          <a:lstStyle/>
-          <a:p>
-            <a:r>
-              <a:rPr lang="en-US" b="1" dirty="0" smtClean="0">
-                <a:latin typeface="Arial" panose="020B0604020202020204" pitchFamily="34" charset="0"/>
-                <a:cs typeface="Arial" panose="020B0604020202020204" pitchFamily="34" charset="0"/>
-              </a:rPr>
-              <a:t>2. Thêm Thành Viên</a:t>
-            </a:r>
-            <a:endParaRPr lang="en-US" b="1" dirty="0">
-              <a:latin typeface="Arial" panose="020B0604020202020204" pitchFamily="34" charset="0"/>
-              <a:cs typeface="Arial" panose="020B0604020202020204" pitchFamily="34" charset="0"/>
-            </a:endParaRPr>
-          </a:p>
-        </p:txBody>
-      </p:sp>
-      <p:sp>
-        <p:nvSpPr>
-          <p:cNvPr id="3" name="Rounded Rectangle 2"/>
-          <p:cNvSpPr/>
-          <p:nvPr/>
-        </p:nvSpPr>
-        <p:spPr>
-          <a:xfrm>
-            <a:off x="1085850" y="2571748"/>
-            <a:ext cx="2039899" cy="726621"/>
-          </a:xfrm>
-          <a:prstGeom prst="roundRect">
-            <a:avLst/>
-          </a:prstGeom>
-        </p:spPr>
-        <p:style>
-          <a:lnRef idx="2">
-            <a:schemeClr val="accent1">
-              <a:shade val="50000"/>
-            </a:schemeClr>
-          </a:lnRef>
-          <a:fillRef idx="1">
-            <a:schemeClr val="accent1"/>
-          </a:fillRef>
-          <a:effectRef idx="0">
-            <a:schemeClr val="accent1"/>
-          </a:effectRef>
-          <a:fontRef idx="minor">
-            <a:schemeClr val="lt1"/>
-          </a:fontRef>
-        </p:style>
-        <p:txBody>
-          <a:bodyPr rtlCol="0" anchor="ctr"/>
-          <a:lstStyle/>
-          <a:p>
-            <a:pPr algn="ctr"/>
-            <a:r>
-              <a:rPr lang="en-US" dirty="0" smtClean="0"/>
-              <a:t>Nhập Tên/ Email</a:t>
-            </a:r>
-            <a:endParaRPr lang="en-US" dirty="0"/>
-          </a:p>
-        </p:txBody>
-      </p:sp>
-      <p:sp>
-        <p:nvSpPr>
-          <p:cNvPr id="8" name="Rounded Rectangle 7"/>
-          <p:cNvSpPr/>
-          <p:nvPr/>
-        </p:nvSpPr>
-        <p:spPr>
-          <a:xfrm>
-            <a:off x="3469200" y="2571748"/>
-            <a:ext cx="1927391" cy="726621"/>
-          </a:xfrm>
-          <a:prstGeom prst="roundRect">
-            <a:avLst/>
-          </a:prstGeom>
-        </p:spPr>
-        <p:style>
-          <a:lnRef idx="2">
-            <a:schemeClr val="accent1">
-              <a:shade val="50000"/>
-            </a:schemeClr>
-          </a:lnRef>
-          <a:fillRef idx="1">
-            <a:schemeClr val="accent1"/>
-          </a:fillRef>
-          <a:effectRef idx="0">
-            <a:schemeClr val="accent1"/>
-          </a:effectRef>
-          <a:fontRef idx="minor">
-            <a:schemeClr val="lt1"/>
-          </a:fontRef>
-        </p:style>
-        <p:txBody>
-          <a:bodyPr rtlCol="0" anchor="ctr"/>
-          <a:lstStyle/>
-          <a:p>
-            <a:pPr algn="ctr"/>
-            <a:r>
-              <a:rPr lang="en-US" dirty="0" smtClean="0"/>
-              <a:t>Chọn Người Muốn Thêm</a:t>
-            </a:r>
-            <a:endParaRPr lang="en-US" dirty="0"/>
-          </a:p>
-        </p:txBody>
-      </p:sp>
-      <p:sp>
-        <p:nvSpPr>
-          <p:cNvPr id="9" name="Rounded Rectangle 8"/>
-          <p:cNvSpPr/>
-          <p:nvPr/>
-        </p:nvSpPr>
-        <p:spPr>
-          <a:xfrm>
-            <a:off x="5740042" y="2571748"/>
-            <a:ext cx="1927391" cy="726621"/>
-          </a:xfrm>
-          <a:prstGeom prst="roundRect">
-            <a:avLst/>
-          </a:prstGeom>
-        </p:spPr>
-        <p:style>
-          <a:lnRef idx="2">
-            <a:schemeClr val="accent1">
-              <a:shade val="50000"/>
-            </a:schemeClr>
-          </a:lnRef>
-          <a:fillRef idx="1">
-            <a:schemeClr val="accent1"/>
-          </a:fillRef>
-          <a:effectRef idx="0">
-            <a:schemeClr val="accent1"/>
-          </a:effectRef>
-          <a:fontRef idx="minor">
-            <a:schemeClr val="lt1"/>
-          </a:fontRef>
-        </p:style>
-        <p:txBody>
-          <a:bodyPr rtlCol="0" anchor="ctr"/>
-          <a:lstStyle/>
-          <a:p>
-            <a:pPr algn="ctr"/>
-            <a:r>
-              <a:rPr lang="en-US" dirty="0" smtClean="0"/>
-              <a:t>Thành Viên Mới Gia Nhập</a:t>
-            </a:r>
-            <a:endParaRPr lang="en-US" dirty="0"/>
-          </a:p>
-        </p:txBody>
-      </p:sp>
-      <p:cxnSp>
-        <p:nvCxnSpPr>
-          <p:cNvPr id="11" name="Straight Arrow Connector 10"/>
-          <p:cNvCxnSpPr>
-            <a:stCxn id="3" idx="3"/>
-            <a:endCxn id="8" idx="1"/>
-          </p:cNvCxnSpPr>
-          <p:nvPr/>
-        </p:nvCxnSpPr>
-        <p:spPr>
-          <a:xfrm>
-            <a:off x="3125749" y="2935059"/>
-            <a:ext cx="343451" cy="0"/>
-          </a:xfrm>
-          <a:prstGeom prst="straightConnector1">
-            <a:avLst/>
-          </a:prstGeom>
-          <a:ln>
-            <a:tailEnd type="triangle"/>
-          </a:ln>
-        </p:spPr>
-        <p:style>
-          <a:lnRef idx="2">
-            <a:schemeClr val="dk1"/>
-          </a:lnRef>
-          <a:fillRef idx="0">
-            <a:schemeClr val="dk1"/>
-          </a:fillRef>
-          <a:effectRef idx="1">
-            <a:schemeClr val="dk1"/>
-          </a:effectRef>
-          <a:fontRef idx="minor">
-            <a:schemeClr val="tx1"/>
-          </a:fontRef>
-        </p:style>
-      </p:cxnSp>
-      <p:cxnSp>
-        <p:nvCxnSpPr>
-          <p:cNvPr id="13" name="Straight Arrow Connector 12"/>
-          <p:cNvCxnSpPr>
-            <a:stCxn id="8" idx="3"/>
-            <a:endCxn id="9" idx="1"/>
-          </p:cNvCxnSpPr>
-          <p:nvPr/>
-        </p:nvCxnSpPr>
-        <p:spPr>
-          <a:xfrm>
-            <a:off x="5396591" y="2935059"/>
-            <a:ext cx="343451" cy="0"/>
-          </a:xfrm>
-          <a:prstGeom prst="straightConnector1">
-            <a:avLst/>
-          </a:prstGeom>
-          <a:ln>
-            <a:tailEnd type="triangle"/>
-          </a:ln>
-        </p:spPr>
-        <p:style>
-          <a:lnRef idx="2">
-            <a:schemeClr val="dk1"/>
-          </a:lnRef>
-          <a:fillRef idx="0">
-            <a:schemeClr val="dk1"/>
-          </a:fillRef>
-          <a:effectRef idx="1">
-            <a:schemeClr val="dk1"/>
-          </a:effectRef>
-          <a:fontRef idx="minor">
-            <a:schemeClr val="tx1"/>
-          </a:fontRef>
-        </p:style>
-      </p:cxnSp>
-      <p:sp>
-        <p:nvSpPr>
-          <p:cNvPr id="14" name="TextBox 13"/>
-          <p:cNvSpPr txBox="1"/>
-          <p:nvPr/>
-        </p:nvSpPr>
-        <p:spPr>
-          <a:xfrm>
-            <a:off x="1122997" y="3324990"/>
-            <a:ext cx="1965603" cy="276999"/>
-          </a:xfrm>
-          <a:prstGeom prst="rect">
-            <a:avLst/>
-          </a:prstGeom>
-          <a:noFill/>
-        </p:spPr>
-        <p:txBody>
-          <a:bodyPr wrap="none" rtlCol="0">
-            <a:spAutoFit/>
-          </a:bodyPr>
-          <a:lstStyle/>
-          <a:p>
-            <a:r>
-              <a:rPr lang="en-US" sz="1200" b="1" dirty="0" smtClean="0">
-                <a:solidFill>
-                  <a:schemeClr val="tx1">
-                    <a:lumMod val="85000"/>
-                  </a:schemeClr>
-                </a:solidFill>
-                <a:latin typeface="Arial" panose="020B0604020202020204" pitchFamily="34" charset="0"/>
-                <a:cs typeface="Arial" panose="020B0604020202020204" pitchFamily="34" charset="0"/>
-              </a:rPr>
-              <a:t>Thành Viên Trong Nhóm</a:t>
-            </a:r>
-            <a:endParaRPr lang="en-US" sz="1200" b="1" dirty="0">
-              <a:solidFill>
-                <a:schemeClr val="tx1">
-                  <a:lumMod val="85000"/>
-                </a:schemeClr>
-              </a:solidFill>
-              <a:latin typeface="Arial" panose="020B0604020202020204" pitchFamily="34" charset="0"/>
-              <a:cs typeface="Arial" panose="020B0604020202020204" pitchFamily="34" charset="0"/>
-            </a:endParaRPr>
-          </a:p>
-        </p:txBody>
-      </p:sp>
-      <p:sp>
-        <p:nvSpPr>
-          <p:cNvPr id="15" name="TextBox 14"/>
-          <p:cNvSpPr txBox="1"/>
-          <p:nvPr/>
-        </p:nvSpPr>
-        <p:spPr>
-          <a:xfrm>
-            <a:off x="855526" y="3903098"/>
-            <a:ext cx="2475999" cy="369332"/>
-          </a:xfrm>
-          <a:prstGeom prst="rect">
-            <a:avLst/>
-          </a:prstGeom>
-          <a:noFill/>
-        </p:spPr>
-        <p:txBody>
-          <a:bodyPr wrap="none" rtlCol="0">
-            <a:spAutoFit/>
-          </a:bodyPr>
-          <a:lstStyle/>
-          <a:p>
-            <a:r>
-              <a:rPr lang="en-US" b="1" dirty="0" smtClean="0">
-                <a:latin typeface="Arial" panose="020B0604020202020204" pitchFamily="34" charset="0"/>
-                <a:cs typeface="Arial" panose="020B0604020202020204" pitchFamily="34" charset="0"/>
-              </a:rPr>
-              <a:t>3. Yêu Cầu Tham Gia</a:t>
-            </a:r>
-            <a:endParaRPr lang="en-US" b="1" dirty="0">
-              <a:latin typeface="Arial" panose="020B0604020202020204" pitchFamily="34" charset="0"/>
-              <a:cs typeface="Arial" panose="020B0604020202020204" pitchFamily="34" charset="0"/>
-            </a:endParaRPr>
-          </a:p>
-        </p:txBody>
-      </p:sp>
-      <p:sp>
-        <p:nvSpPr>
-          <p:cNvPr id="16" name="Rounded Rectangle 15"/>
-          <p:cNvSpPr/>
-          <p:nvPr/>
-        </p:nvSpPr>
-        <p:spPr>
-          <a:xfrm>
-            <a:off x="1085850" y="4588966"/>
-            <a:ext cx="2039899" cy="726621"/>
-          </a:xfrm>
-          <a:prstGeom prst="roundRect">
-            <a:avLst/>
-          </a:prstGeom>
-        </p:spPr>
-        <p:style>
-          <a:lnRef idx="2">
-            <a:schemeClr val="accent1">
-              <a:shade val="50000"/>
-            </a:schemeClr>
-          </a:lnRef>
-          <a:fillRef idx="1">
-            <a:schemeClr val="accent1"/>
-          </a:fillRef>
-          <a:effectRef idx="0">
-            <a:schemeClr val="accent1"/>
-          </a:effectRef>
-          <a:fontRef idx="minor">
-            <a:schemeClr val="lt1"/>
-          </a:fontRef>
-        </p:style>
-        <p:txBody>
-          <a:bodyPr rtlCol="0" anchor="ctr"/>
-          <a:lstStyle/>
-          <a:p>
-            <a:pPr algn="ctr"/>
-            <a:r>
-              <a:rPr lang="en-US" dirty="0" smtClean="0"/>
-              <a:t>Tìm Nhóm Theo Tên</a:t>
-            </a:r>
-            <a:endParaRPr lang="en-US" dirty="0"/>
-          </a:p>
-        </p:txBody>
-      </p:sp>
-      <p:sp>
-        <p:nvSpPr>
-          <p:cNvPr id="17" name="Rounded Rectangle 16"/>
-          <p:cNvSpPr/>
-          <p:nvPr/>
-        </p:nvSpPr>
-        <p:spPr>
-          <a:xfrm>
-            <a:off x="3469200" y="4588966"/>
-            <a:ext cx="1927391" cy="726621"/>
-          </a:xfrm>
-          <a:prstGeom prst="roundRect">
-            <a:avLst/>
-          </a:prstGeom>
-        </p:spPr>
-        <p:style>
-          <a:lnRef idx="2">
-            <a:schemeClr val="accent1">
-              <a:shade val="50000"/>
-            </a:schemeClr>
-          </a:lnRef>
-          <a:fillRef idx="1">
-            <a:schemeClr val="accent1"/>
-          </a:fillRef>
-          <a:effectRef idx="0">
-            <a:schemeClr val="accent1"/>
-          </a:effectRef>
-          <a:fontRef idx="minor">
-            <a:schemeClr val="lt1"/>
-          </a:fontRef>
-        </p:style>
-        <p:txBody>
-          <a:bodyPr rtlCol="0" anchor="ctr"/>
-          <a:lstStyle/>
-          <a:p>
-            <a:pPr algn="ctr"/>
-            <a:r>
-              <a:rPr lang="en-US" dirty="0" smtClean="0"/>
-              <a:t>Chọn Nhóm</a:t>
-            </a:r>
-            <a:endParaRPr lang="en-US" dirty="0"/>
-          </a:p>
-        </p:txBody>
-      </p:sp>
-      <p:sp>
-        <p:nvSpPr>
-          <p:cNvPr id="18" name="Rounded Rectangle 17"/>
-          <p:cNvSpPr/>
-          <p:nvPr/>
-        </p:nvSpPr>
-        <p:spPr>
-          <a:xfrm>
-            <a:off x="5740042" y="4588966"/>
-            <a:ext cx="1927391" cy="726621"/>
-          </a:xfrm>
-          <a:prstGeom prst="roundRect">
-            <a:avLst/>
-          </a:prstGeom>
-        </p:spPr>
-        <p:style>
-          <a:lnRef idx="2">
-            <a:schemeClr val="accent1">
-              <a:shade val="50000"/>
-            </a:schemeClr>
-          </a:lnRef>
-          <a:fillRef idx="1">
-            <a:schemeClr val="accent1"/>
-          </a:fillRef>
-          <a:effectRef idx="0">
-            <a:schemeClr val="accent1"/>
-          </a:effectRef>
-          <a:fontRef idx="minor">
-            <a:schemeClr val="lt1"/>
-          </a:fontRef>
-        </p:style>
-        <p:txBody>
-          <a:bodyPr rtlCol="0" anchor="ctr"/>
-          <a:lstStyle/>
-          <a:p>
-            <a:pPr algn="ctr"/>
-            <a:r>
-              <a:rPr lang="en-US" dirty="0" smtClean="0"/>
-              <a:t>Thông Báo Có Yêu Cầu Mới</a:t>
-            </a:r>
-            <a:endParaRPr lang="en-US" dirty="0"/>
-          </a:p>
-        </p:txBody>
-      </p:sp>
-      <p:cxnSp>
-        <p:nvCxnSpPr>
-          <p:cNvPr id="19" name="Straight Arrow Connector 18"/>
-          <p:cNvCxnSpPr>
-            <a:stCxn id="16" idx="3"/>
-            <a:endCxn id="17" idx="1"/>
-          </p:cNvCxnSpPr>
-          <p:nvPr/>
-        </p:nvCxnSpPr>
-        <p:spPr>
-          <a:xfrm>
-            <a:off x="3125749" y="4952277"/>
-            <a:ext cx="343451" cy="0"/>
-          </a:xfrm>
-          <a:prstGeom prst="straightConnector1">
-            <a:avLst/>
-          </a:prstGeom>
-          <a:ln>
-            <a:tailEnd type="triangle"/>
-          </a:ln>
-        </p:spPr>
-        <p:style>
-          <a:lnRef idx="2">
-            <a:schemeClr val="dk1"/>
-          </a:lnRef>
-          <a:fillRef idx="0">
-            <a:schemeClr val="dk1"/>
-          </a:fillRef>
-          <a:effectRef idx="1">
-            <a:schemeClr val="dk1"/>
-          </a:effectRef>
-          <a:fontRef idx="minor">
-            <a:schemeClr val="tx1"/>
-          </a:fontRef>
-        </p:style>
-      </p:cxnSp>
-      <p:cxnSp>
-        <p:nvCxnSpPr>
-          <p:cNvPr id="22" name="Straight Arrow Connector 21"/>
-          <p:cNvCxnSpPr>
-            <a:stCxn id="18" idx="3"/>
-            <a:endCxn id="25" idx="1"/>
-          </p:cNvCxnSpPr>
-          <p:nvPr/>
-        </p:nvCxnSpPr>
-        <p:spPr>
-          <a:xfrm>
-            <a:off x="7667433" y="4952277"/>
-            <a:ext cx="343451" cy="0"/>
-          </a:xfrm>
-          <a:prstGeom prst="straightConnector1">
-            <a:avLst/>
-          </a:prstGeom>
-          <a:ln>
-            <a:tailEnd type="triangle"/>
-          </a:ln>
-        </p:spPr>
-        <p:style>
-          <a:lnRef idx="2">
-            <a:schemeClr val="dk1"/>
-          </a:lnRef>
-          <a:fillRef idx="0">
-            <a:schemeClr val="dk1"/>
-          </a:fillRef>
-          <a:effectRef idx="1">
-            <a:schemeClr val="dk1"/>
-          </a:effectRef>
-          <a:fontRef idx="minor">
-            <a:schemeClr val="tx1"/>
-          </a:fontRef>
-        </p:style>
-      </p:cxnSp>
-      <p:sp>
-        <p:nvSpPr>
-          <p:cNvPr id="25" name="Rounded Rectangle 24"/>
-          <p:cNvSpPr/>
-          <p:nvPr/>
-        </p:nvSpPr>
-        <p:spPr>
-          <a:xfrm>
-            <a:off x="8010884" y="4588966"/>
-            <a:ext cx="1927391" cy="726621"/>
-          </a:xfrm>
-          <a:prstGeom prst="roundRect">
-            <a:avLst/>
-          </a:prstGeom>
-        </p:spPr>
-        <p:style>
-          <a:lnRef idx="2">
-            <a:schemeClr val="accent1">
-              <a:shade val="50000"/>
-            </a:schemeClr>
-          </a:lnRef>
-          <a:fillRef idx="1">
-            <a:schemeClr val="accent1"/>
-          </a:fillRef>
-          <a:effectRef idx="0">
-            <a:schemeClr val="accent1"/>
-          </a:effectRef>
-          <a:fontRef idx="minor">
-            <a:schemeClr val="lt1"/>
-          </a:fontRef>
-        </p:style>
-        <p:txBody>
-          <a:bodyPr rtlCol="0" anchor="ctr"/>
-          <a:lstStyle/>
-          <a:p>
-            <a:pPr algn="ctr"/>
-            <a:r>
-              <a:rPr lang="en-US" dirty="0" smtClean="0"/>
-              <a:t>Đồng Ý</a:t>
-            </a:r>
-            <a:endParaRPr lang="en-US" dirty="0"/>
-          </a:p>
-        </p:txBody>
-      </p:sp>
-      <p:cxnSp>
-        <p:nvCxnSpPr>
-          <p:cNvPr id="35" name="Straight Arrow Connector 34"/>
-          <p:cNvCxnSpPr>
-            <a:stCxn id="17" idx="3"/>
-            <a:endCxn id="18" idx="1"/>
-          </p:cNvCxnSpPr>
-          <p:nvPr/>
-        </p:nvCxnSpPr>
-        <p:spPr>
-          <a:xfrm>
-            <a:off x="5396591" y="4952277"/>
-            <a:ext cx="343451" cy="0"/>
-          </a:xfrm>
-          <a:prstGeom prst="straightConnector1">
-            <a:avLst/>
-          </a:prstGeom>
-          <a:ln>
-            <a:tailEnd type="triangle"/>
-          </a:ln>
-        </p:spPr>
-        <p:style>
-          <a:lnRef idx="2">
-            <a:schemeClr val="dk1"/>
-          </a:lnRef>
-          <a:fillRef idx="0">
-            <a:schemeClr val="dk1"/>
-          </a:fillRef>
-          <a:effectRef idx="1">
-            <a:schemeClr val="dk1"/>
-          </a:effectRef>
-          <a:fontRef idx="minor">
-            <a:schemeClr val="tx1"/>
-          </a:fontRef>
-        </p:style>
-      </p:cxnSp>
-      <p:sp>
-        <p:nvSpPr>
-          <p:cNvPr id="39" name="Rounded Rectangle 38"/>
-          <p:cNvSpPr/>
-          <p:nvPr/>
-        </p:nvSpPr>
-        <p:spPr>
-          <a:xfrm>
-            <a:off x="8010884" y="5678898"/>
-            <a:ext cx="1927391" cy="726621"/>
-          </a:xfrm>
-          <a:prstGeom prst="roundRect">
-            <a:avLst/>
-          </a:prstGeom>
-        </p:spPr>
-        <p:style>
-          <a:lnRef idx="2">
-            <a:schemeClr val="accent1">
-              <a:shade val="50000"/>
-            </a:schemeClr>
-          </a:lnRef>
-          <a:fillRef idx="1">
-            <a:schemeClr val="accent1"/>
-          </a:fillRef>
-          <a:effectRef idx="0">
-            <a:schemeClr val="accent1"/>
-          </a:effectRef>
-          <a:fontRef idx="minor">
-            <a:schemeClr val="lt1"/>
-          </a:fontRef>
-        </p:style>
-        <p:txBody>
-          <a:bodyPr rtlCol="0" anchor="ctr"/>
-          <a:lstStyle/>
-          <a:p>
-            <a:pPr algn="ctr"/>
-            <a:r>
-              <a:rPr lang="en-US" dirty="0" smtClean="0"/>
-              <a:t>Cầu Được Chấp Nhận</a:t>
-            </a:r>
-            <a:endParaRPr lang="en-US" dirty="0"/>
-          </a:p>
-        </p:txBody>
-      </p:sp>
-      <p:cxnSp>
-        <p:nvCxnSpPr>
-          <p:cNvPr id="40" name="Straight Arrow Connector 39"/>
-          <p:cNvCxnSpPr>
-            <a:stCxn id="25" idx="2"/>
-            <a:endCxn id="39" idx="0"/>
-          </p:cNvCxnSpPr>
-          <p:nvPr/>
-        </p:nvCxnSpPr>
-        <p:spPr>
-          <a:xfrm>
-            <a:off x="8974580" y="5315587"/>
-            <a:ext cx="0" cy="363311"/>
-          </a:xfrm>
-          <a:prstGeom prst="straightConnector1">
-            <a:avLst/>
-          </a:prstGeom>
-          <a:ln>
-            <a:tailEnd type="triangle"/>
-          </a:ln>
-        </p:spPr>
-        <p:style>
-          <a:lnRef idx="2">
-            <a:schemeClr val="dk1"/>
-          </a:lnRef>
-          <a:fillRef idx="0">
-            <a:schemeClr val="dk1"/>
-          </a:fillRef>
-          <a:effectRef idx="1">
-            <a:schemeClr val="dk1"/>
-          </a:effectRef>
-          <a:fontRef idx="minor">
-            <a:schemeClr val="tx1"/>
-          </a:fontRef>
-        </p:style>
-      </p:cxnSp>
-      <p:sp>
-        <p:nvSpPr>
-          <p:cNvPr id="44" name="TextBox 43"/>
-          <p:cNvSpPr txBox="1"/>
-          <p:nvPr/>
-        </p:nvSpPr>
-        <p:spPr>
-          <a:xfrm>
-            <a:off x="1085850" y="5401899"/>
-            <a:ext cx="2204450" cy="276999"/>
-          </a:xfrm>
-          <a:prstGeom prst="rect">
-            <a:avLst/>
-          </a:prstGeom>
-          <a:noFill/>
-        </p:spPr>
-        <p:txBody>
-          <a:bodyPr wrap="none" rtlCol="0">
-            <a:spAutoFit/>
-          </a:bodyPr>
-          <a:lstStyle/>
-          <a:p>
-            <a:r>
-              <a:rPr lang="en-US" sz="1200" b="1" dirty="0" smtClean="0">
-                <a:solidFill>
-                  <a:schemeClr val="tx1">
-                    <a:lumMod val="85000"/>
-                  </a:schemeClr>
-                </a:solidFill>
-                <a:latin typeface="Arial" panose="020B0604020202020204" pitchFamily="34" charset="0"/>
-                <a:cs typeface="Arial" panose="020B0604020202020204" pitchFamily="34" charset="0"/>
-              </a:rPr>
-              <a:t>User Muốn Tham Gia Nhóm</a:t>
-            </a:r>
-            <a:endParaRPr lang="en-US" sz="1200" b="1" dirty="0">
-              <a:solidFill>
-                <a:schemeClr val="tx1">
-                  <a:lumMod val="85000"/>
-                </a:schemeClr>
-              </a:solidFill>
               <a:latin typeface="Arial" panose="020B0604020202020204" pitchFamily="34" charset="0"/>
               <a:cs typeface="Arial" panose="020B0604020202020204" pitchFamily="34" charset="0"/>
             </a:endParaRPr>

</xml_diff>